<commit_message>
Add new experiment setting
</commit_message>
<xml_diff>
--- a/Presentation1.pptx
+++ b/Presentation1.pptx
@@ -9,6 +9,7 @@
     <p:sldId id="260" r:id="rId3"/>
     <p:sldId id="258" r:id="rId4"/>
     <p:sldId id="259" r:id="rId5"/>
+    <p:sldId id="261" r:id="rId6"/>
   </p:sldIdLst>
   <p:sldSz cx="12192000" cy="6858000"/>
   <p:notesSz cx="6858000" cy="9144000"/>
@@ -291,7 +292,7 @@
           <a:p>
             <a:fld id="{C1267A05-D67B-4E4C-868C-590CB66AEB3E}" type="datetimeFigureOut">
               <a:rPr lang="en-US" smtClean="0"/>
-              <a:t>2/21/2023</a:t>
+              <a:t>3/1/2023</a:t>
             </a:fld>
             <a:endParaRPr lang="en-US"/>
           </a:p>
@@ -489,7 +490,7 @@
           <a:p>
             <a:fld id="{C1267A05-D67B-4E4C-868C-590CB66AEB3E}" type="datetimeFigureOut">
               <a:rPr lang="en-US" smtClean="0"/>
-              <a:t>2/21/2023</a:t>
+              <a:t>3/1/2023</a:t>
             </a:fld>
             <a:endParaRPr lang="en-US"/>
           </a:p>
@@ -697,7 +698,7 @@
           <a:p>
             <a:fld id="{C1267A05-D67B-4E4C-868C-590CB66AEB3E}" type="datetimeFigureOut">
               <a:rPr lang="en-US" smtClean="0"/>
-              <a:t>2/21/2023</a:t>
+              <a:t>3/1/2023</a:t>
             </a:fld>
             <a:endParaRPr lang="en-US"/>
           </a:p>
@@ -895,7 +896,7 @@
           <a:p>
             <a:fld id="{C1267A05-D67B-4E4C-868C-590CB66AEB3E}" type="datetimeFigureOut">
               <a:rPr lang="en-US" smtClean="0"/>
-              <a:t>2/21/2023</a:t>
+              <a:t>3/1/2023</a:t>
             </a:fld>
             <a:endParaRPr lang="en-US"/>
           </a:p>
@@ -1170,7 +1171,7 @@
           <a:p>
             <a:fld id="{C1267A05-D67B-4E4C-868C-590CB66AEB3E}" type="datetimeFigureOut">
               <a:rPr lang="en-US" smtClean="0"/>
-              <a:t>2/21/2023</a:t>
+              <a:t>3/1/2023</a:t>
             </a:fld>
             <a:endParaRPr lang="en-US"/>
           </a:p>
@@ -1435,7 +1436,7 @@
           <a:p>
             <a:fld id="{C1267A05-D67B-4E4C-868C-590CB66AEB3E}" type="datetimeFigureOut">
               <a:rPr lang="en-US" smtClean="0"/>
-              <a:t>2/21/2023</a:t>
+              <a:t>3/1/2023</a:t>
             </a:fld>
             <a:endParaRPr lang="en-US"/>
           </a:p>
@@ -1847,7 +1848,7 @@
           <a:p>
             <a:fld id="{C1267A05-D67B-4E4C-868C-590CB66AEB3E}" type="datetimeFigureOut">
               <a:rPr lang="en-US" smtClean="0"/>
-              <a:t>2/21/2023</a:t>
+              <a:t>3/1/2023</a:t>
             </a:fld>
             <a:endParaRPr lang="en-US"/>
           </a:p>
@@ -1988,7 +1989,7 @@
           <a:p>
             <a:fld id="{C1267A05-D67B-4E4C-868C-590CB66AEB3E}" type="datetimeFigureOut">
               <a:rPr lang="en-US" smtClean="0"/>
-              <a:t>2/21/2023</a:t>
+              <a:t>3/1/2023</a:t>
             </a:fld>
             <a:endParaRPr lang="en-US"/>
           </a:p>
@@ -2101,7 +2102,7 @@
           <a:p>
             <a:fld id="{C1267A05-D67B-4E4C-868C-590CB66AEB3E}" type="datetimeFigureOut">
               <a:rPr lang="en-US" smtClean="0"/>
-              <a:t>2/21/2023</a:t>
+              <a:t>3/1/2023</a:t>
             </a:fld>
             <a:endParaRPr lang="en-US"/>
           </a:p>
@@ -2412,7 +2413,7 @@
           <a:p>
             <a:fld id="{C1267A05-D67B-4E4C-868C-590CB66AEB3E}" type="datetimeFigureOut">
               <a:rPr lang="en-US" smtClean="0"/>
-              <a:t>2/21/2023</a:t>
+              <a:t>3/1/2023</a:t>
             </a:fld>
             <a:endParaRPr lang="en-US"/>
           </a:p>
@@ -2700,7 +2701,7 @@
           <a:p>
             <a:fld id="{C1267A05-D67B-4E4C-868C-590CB66AEB3E}" type="datetimeFigureOut">
               <a:rPr lang="en-US" smtClean="0"/>
-              <a:t>2/21/2023</a:t>
+              <a:t>3/1/2023</a:t>
             </a:fld>
             <a:endParaRPr lang="en-US"/>
           </a:p>
@@ -2941,7 +2942,7 @@
           <a:p>
             <a:fld id="{C1267A05-D67B-4E4C-868C-590CB66AEB3E}" type="datetimeFigureOut">
               <a:rPr lang="en-US" smtClean="0"/>
-              <a:t>2/21/2023</a:t>
+              <a:t>3/1/2023</a:t>
             </a:fld>
             <a:endParaRPr lang="en-US"/>
           </a:p>
@@ -10665,6 +10666,4068 @@
 </p:sld>
 </file>
 
+<file path=ppt/slides/slide5.xml><?xml version="1.0" encoding="utf-8"?>
+<p:sld xmlns:a="http://schemas.openxmlformats.org/drawingml/2006/main" xmlns:r="http://schemas.openxmlformats.org/officeDocument/2006/relationships" xmlns:p="http://schemas.openxmlformats.org/presentationml/2006/main">
+  <p:cSld>
+    <p:spTree>
+      <p:nvGrpSpPr>
+        <p:cNvPr id="1" name=""/>
+        <p:cNvGrpSpPr/>
+        <p:nvPr/>
+      </p:nvGrpSpPr>
+      <p:grpSpPr>
+        <a:xfrm>
+          <a:off x="0" y="0"/>
+          <a:ext cx="0" cy="0"/>
+          <a:chOff x="0" y="0"/>
+          <a:chExt cx="0" cy="0"/>
+        </a:xfrm>
+      </p:grpSpPr>
+      <p:graphicFrame>
+        <p:nvGraphicFramePr>
+          <p:cNvPr id="2" name="Table 2">
+            <a:extLst>
+              <a:ext uri="{FF2B5EF4-FFF2-40B4-BE49-F238E27FC236}">
+                <a16:creationId xmlns:a16="http://schemas.microsoft.com/office/drawing/2014/main" id="{C88644AC-C1C7-4CC7-BBCB-0877A80A4FA8}"/>
+              </a:ext>
+            </a:extLst>
+          </p:cNvPr>
+          <p:cNvGraphicFramePr>
+            <a:graphicFrameLocks noGrp="1"/>
+          </p:cNvGraphicFramePr>
+          <p:nvPr>
+            <p:extLst>
+              <p:ext uri="{D42A27DB-BD31-4B8C-83A1-F6EECF244321}">
+                <p14:modId xmlns:p14="http://schemas.microsoft.com/office/powerpoint/2010/main" val="2497660591"/>
+              </p:ext>
+            </p:extLst>
+          </p:nvPr>
+        </p:nvGraphicFramePr>
+        <p:xfrm>
+          <a:off x="3145871" y="218114"/>
+          <a:ext cx="6862192" cy="6484696"/>
+        </p:xfrm>
+        <a:graphic>
+          <a:graphicData uri="http://schemas.openxmlformats.org/drawingml/2006/table">
+            <a:tbl>
+              <a:tblPr firstRow="1" bandRow="1">
+                <a:tableStyleId>{5C22544A-7EE6-4342-B048-85BDC9FD1C3A}</a:tableStyleId>
+              </a:tblPr>
+              <a:tblGrid>
+                <a:gridCol w="857774">
+                  <a:extLst>
+                    <a:ext uri="{9D8B030D-6E8A-4147-A177-3AD203B41FA5}">
+                      <a16:colId xmlns:a16="http://schemas.microsoft.com/office/drawing/2014/main" val="318100156"/>
+                    </a:ext>
+                  </a:extLst>
+                </a:gridCol>
+                <a:gridCol w="857774">
+                  <a:extLst>
+                    <a:ext uri="{9D8B030D-6E8A-4147-A177-3AD203B41FA5}">
+                      <a16:colId xmlns:a16="http://schemas.microsoft.com/office/drawing/2014/main" val="3667279437"/>
+                    </a:ext>
+                  </a:extLst>
+                </a:gridCol>
+                <a:gridCol w="857774">
+                  <a:extLst>
+                    <a:ext uri="{9D8B030D-6E8A-4147-A177-3AD203B41FA5}">
+                      <a16:colId xmlns:a16="http://schemas.microsoft.com/office/drawing/2014/main" val="643386300"/>
+                    </a:ext>
+                  </a:extLst>
+                </a:gridCol>
+                <a:gridCol w="857774">
+                  <a:extLst>
+                    <a:ext uri="{9D8B030D-6E8A-4147-A177-3AD203B41FA5}">
+                      <a16:colId xmlns:a16="http://schemas.microsoft.com/office/drawing/2014/main" val="2978925617"/>
+                    </a:ext>
+                  </a:extLst>
+                </a:gridCol>
+                <a:gridCol w="857774">
+                  <a:extLst>
+                    <a:ext uri="{9D8B030D-6E8A-4147-A177-3AD203B41FA5}">
+                      <a16:colId xmlns:a16="http://schemas.microsoft.com/office/drawing/2014/main" val="2298523877"/>
+                    </a:ext>
+                  </a:extLst>
+                </a:gridCol>
+                <a:gridCol w="857774">
+                  <a:extLst>
+                    <a:ext uri="{9D8B030D-6E8A-4147-A177-3AD203B41FA5}">
+                      <a16:colId xmlns:a16="http://schemas.microsoft.com/office/drawing/2014/main" val="2949982479"/>
+                    </a:ext>
+                  </a:extLst>
+                </a:gridCol>
+                <a:gridCol w="857774">
+                  <a:extLst>
+                    <a:ext uri="{9D8B030D-6E8A-4147-A177-3AD203B41FA5}">
+                      <a16:colId xmlns:a16="http://schemas.microsoft.com/office/drawing/2014/main" val="2410684141"/>
+                    </a:ext>
+                  </a:extLst>
+                </a:gridCol>
+                <a:gridCol w="857774">
+                  <a:extLst>
+                    <a:ext uri="{9D8B030D-6E8A-4147-A177-3AD203B41FA5}">
+                      <a16:colId xmlns:a16="http://schemas.microsoft.com/office/drawing/2014/main" val="1989436909"/>
+                    </a:ext>
+                  </a:extLst>
+                </a:gridCol>
+              </a:tblGrid>
+              <a:tr h="810587">
+                <a:tc>
+                  <a:txBody>
+                    <a:bodyPr/>
+                    <a:lstStyle/>
+                    <a:p>
+                      <a:endParaRPr lang="en-US" dirty="0"/>
+                    </a:p>
+                  </a:txBody>
+                  <a:tcPr>
+                    <a:lnL w="12700" cap="flat" cmpd="sng" algn="ctr">
+                      <a:solidFill>
+                        <a:schemeClr val="tx1"/>
+                      </a:solidFill>
+                      <a:prstDash val="solid"/>
+                      <a:round/>
+                      <a:headEnd type="none" w="med" len="med"/>
+                      <a:tailEnd type="none" w="med" len="med"/>
+                    </a:lnL>
+                    <a:lnR w="12700" cap="flat" cmpd="sng" algn="ctr">
+                      <a:solidFill>
+                        <a:schemeClr val="tx1"/>
+                      </a:solidFill>
+                      <a:prstDash val="solid"/>
+                      <a:round/>
+                      <a:headEnd type="none" w="med" len="med"/>
+                      <a:tailEnd type="none" w="med" len="med"/>
+                    </a:lnR>
+                    <a:lnT w="12700" cap="flat" cmpd="sng" algn="ctr">
+                      <a:solidFill>
+                        <a:schemeClr val="tx1"/>
+                      </a:solidFill>
+                      <a:prstDash val="solid"/>
+                      <a:round/>
+                      <a:headEnd type="none" w="med" len="med"/>
+                      <a:tailEnd type="none" w="med" len="med"/>
+                    </a:lnT>
+                    <a:lnB w="12700" cap="flat" cmpd="sng" algn="ctr">
+                      <a:solidFill>
+                        <a:schemeClr val="tx1"/>
+                      </a:solidFill>
+                      <a:prstDash val="solid"/>
+                      <a:round/>
+                      <a:headEnd type="none" w="med" len="med"/>
+                      <a:tailEnd type="none" w="med" len="med"/>
+                    </a:lnB>
+                    <a:solidFill>
+                      <a:schemeClr val="bg1"/>
+                    </a:solidFill>
+                  </a:tcPr>
+                </a:tc>
+                <a:tc>
+                  <a:txBody>
+                    <a:bodyPr/>
+                    <a:lstStyle/>
+                    <a:p>
+                      <a:endParaRPr lang="en-US" dirty="0"/>
+                    </a:p>
+                  </a:txBody>
+                  <a:tcPr>
+                    <a:lnL w="12700" cap="flat" cmpd="sng" algn="ctr">
+                      <a:solidFill>
+                        <a:schemeClr val="tx1"/>
+                      </a:solidFill>
+                      <a:prstDash val="solid"/>
+                      <a:round/>
+                      <a:headEnd type="none" w="med" len="med"/>
+                      <a:tailEnd type="none" w="med" len="med"/>
+                    </a:lnL>
+                    <a:lnR w="12700" cap="flat" cmpd="sng" algn="ctr">
+                      <a:solidFill>
+                        <a:schemeClr val="tx1"/>
+                      </a:solidFill>
+                      <a:prstDash val="solid"/>
+                      <a:round/>
+                      <a:headEnd type="none" w="med" len="med"/>
+                      <a:tailEnd type="none" w="med" len="med"/>
+                    </a:lnR>
+                    <a:lnT w="12700" cap="flat" cmpd="sng" algn="ctr">
+                      <a:solidFill>
+                        <a:schemeClr val="tx1"/>
+                      </a:solidFill>
+                      <a:prstDash val="solid"/>
+                      <a:round/>
+                      <a:headEnd type="none" w="med" len="med"/>
+                      <a:tailEnd type="none" w="med" len="med"/>
+                    </a:lnT>
+                    <a:lnB w="12700" cap="flat" cmpd="sng" algn="ctr">
+                      <a:solidFill>
+                        <a:schemeClr val="tx1"/>
+                      </a:solidFill>
+                      <a:prstDash val="solid"/>
+                      <a:round/>
+                      <a:headEnd type="none" w="med" len="med"/>
+                      <a:tailEnd type="none" w="med" len="med"/>
+                    </a:lnB>
+                    <a:solidFill>
+                      <a:schemeClr val="bg1"/>
+                    </a:solidFill>
+                  </a:tcPr>
+                </a:tc>
+                <a:tc>
+                  <a:txBody>
+                    <a:bodyPr/>
+                    <a:lstStyle/>
+                    <a:p>
+                      <a:endParaRPr lang="en-US" dirty="0"/>
+                    </a:p>
+                  </a:txBody>
+                  <a:tcPr>
+                    <a:lnL w="12700" cap="flat" cmpd="sng" algn="ctr">
+                      <a:solidFill>
+                        <a:schemeClr val="tx1"/>
+                      </a:solidFill>
+                      <a:prstDash val="solid"/>
+                      <a:round/>
+                      <a:headEnd type="none" w="med" len="med"/>
+                      <a:tailEnd type="none" w="med" len="med"/>
+                    </a:lnL>
+                    <a:lnR w="12700" cap="flat" cmpd="sng" algn="ctr">
+                      <a:solidFill>
+                        <a:schemeClr val="tx1"/>
+                      </a:solidFill>
+                      <a:prstDash val="solid"/>
+                      <a:round/>
+                      <a:headEnd type="none" w="med" len="med"/>
+                      <a:tailEnd type="none" w="med" len="med"/>
+                    </a:lnR>
+                    <a:lnT w="12700" cap="flat" cmpd="sng" algn="ctr">
+                      <a:solidFill>
+                        <a:schemeClr val="tx1"/>
+                      </a:solidFill>
+                      <a:prstDash val="solid"/>
+                      <a:round/>
+                      <a:headEnd type="none" w="med" len="med"/>
+                      <a:tailEnd type="none" w="med" len="med"/>
+                    </a:lnT>
+                    <a:lnB w="12700" cap="flat" cmpd="sng" algn="ctr">
+                      <a:solidFill>
+                        <a:schemeClr val="tx1"/>
+                      </a:solidFill>
+                      <a:prstDash val="solid"/>
+                      <a:round/>
+                      <a:headEnd type="none" w="med" len="med"/>
+                      <a:tailEnd type="none" w="med" len="med"/>
+                    </a:lnB>
+                    <a:solidFill>
+                      <a:schemeClr val="bg1"/>
+                    </a:solidFill>
+                  </a:tcPr>
+                </a:tc>
+                <a:tc>
+                  <a:txBody>
+                    <a:bodyPr/>
+                    <a:lstStyle/>
+                    <a:p>
+                      <a:endParaRPr lang="en-US"/>
+                    </a:p>
+                  </a:txBody>
+                  <a:tcPr>
+                    <a:lnL w="12700" cap="flat" cmpd="sng" algn="ctr">
+                      <a:solidFill>
+                        <a:schemeClr val="tx1"/>
+                      </a:solidFill>
+                      <a:prstDash val="solid"/>
+                      <a:round/>
+                      <a:headEnd type="none" w="med" len="med"/>
+                      <a:tailEnd type="none" w="med" len="med"/>
+                    </a:lnL>
+                    <a:lnR w="12700" cap="flat" cmpd="sng" algn="ctr">
+                      <a:solidFill>
+                        <a:schemeClr val="tx1"/>
+                      </a:solidFill>
+                      <a:prstDash val="solid"/>
+                      <a:round/>
+                      <a:headEnd type="none" w="med" len="med"/>
+                      <a:tailEnd type="none" w="med" len="med"/>
+                    </a:lnR>
+                    <a:lnT w="12700" cap="flat" cmpd="sng" algn="ctr">
+                      <a:solidFill>
+                        <a:schemeClr val="tx1"/>
+                      </a:solidFill>
+                      <a:prstDash val="solid"/>
+                      <a:round/>
+                      <a:headEnd type="none" w="med" len="med"/>
+                      <a:tailEnd type="none" w="med" len="med"/>
+                    </a:lnT>
+                    <a:lnB w="12700" cap="flat" cmpd="sng" algn="ctr">
+                      <a:solidFill>
+                        <a:schemeClr val="tx1"/>
+                      </a:solidFill>
+                      <a:prstDash val="solid"/>
+                      <a:round/>
+                      <a:headEnd type="none" w="med" len="med"/>
+                      <a:tailEnd type="none" w="med" len="med"/>
+                    </a:lnB>
+                    <a:solidFill>
+                      <a:schemeClr val="bg1"/>
+                    </a:solidFill>
+                  </a:tcPr>
+                </a:tc>
+                <a:tc>
+                  <a:txBody>
+                    <a:bodyPr/>
+                    <a:lstStyle/>
+                    <a:p>
+                      <a:endParaRPr lang="en-US" dirty="0"/>
+                    </a:p>
+                  </a:txBody>
+                  <a:tcPr>
+                    <a:lnL w="12700" cap="flat" cmpd="sng" algn="ctr">
+                      <a:solidFill>
+                        <a:schemeClr val="tx1"/>
+                      </a:solidFill>
+                      <a:prstDash val="solid"/>
+                      <a:round/>
+                      <a:headEnd type="none" w="med" len="med"/>
+                      <a:tailEnd type="none" w="med" len="med"/>
+                    </a:lnL>
+                    <a:lnR w="12700" cap="flat" cmpd="sng" algn="ctr">
+                      <a:solidFill>
+                        <a:schemeClr val="tx1"/>
+                      </a:solidFill>
+                      <a:prstDash val="solid"/>
+                      <a:round/>
+                      <a:headEnd type="none" w="med" len="med"/>
+                      <a:tailEnd type="none" w="med" len="med"/>
+                    </a:lnR>
+                    <a:lnT w="12700" cap="flat" cmpd="sng" algn="ctr">
+                      <a:solidFill>
+                        <a:schemeClr val="tx1"/>
+                      </a:solidFill>
+                      <a:prstDash val="solid"/>
+                      <a:round/>
+                      <a:headEnd type="none" w="med" len="med"/>
+                      <a:tailEnd type="none" w="med" len="med"/>
+                    </a:lnT>
+                    <a:lnB w="12700" cap="flat" cmpd="sng" algn="ctr">
+                      <a:solidFill>
+                        <a:schemeClr val="tx1"/>
+                      </a:solidFill>
+                      <a:prstDash val="solid"/>
+                      <a:round/>
+                      <a:headEnd type="none" w="med" len="med"/>
+                      <a:tailEnd type="none" w="med" len="med"/>
+                    </a:lnB>
+                    <a:solidFill>
+                      <a:schemeClr val="bg1"/>
+                    </a:solidFill>
+                  </a:tcPr>
+                </a:tc>
+                <a:tc>
+                  <a:txBody>
+                    <a:bodyPr/>
+                    <a:lstStyle/>
+                    <a:p>
+                      <a:endParaRPr lang="en-US"/>
+                    </a:p>
+                  </a:txBody>
+                  <a:tcPr>
+                    <a:lnL w="12700" cap="flat" cmpd="sng" algn="ctr">
+                      <a:solidFill>
+                        <a:schemeClr val="tx1"/>
+                      </a:solidFill>
+                      <a:prstDash val="solid"/>
+                      <a:round/>
+                      <a:headEnd type="none" w="med" len="med"/>
+                      <a:tailEnd type="none" w="med" len="med"/>
+                    </a:lnL>
+                    <a:lnR w="12700" cap="flat" cmpd="sng" algn="ctr">
+                      <a:solidFill>
+                        <a:schemeClr val="tx1"/>
+                      </a:solidFill>
+                      <a:prstDash val="solid"/>
+                      <a:round/>
+                      <a:headEnd type="none" w="med" len="med"/>
+                      <a:tailEnd type="none" w="med" len="med"/>
+                    </a:lnR>
+                    <a:lnT w="12700" cap="flat" cmpd="sng" algn="ctr">
+                      <a:solidFill>
+                        <a:schemeClr val="tx1"/>
+                      </a:solidFill>
+                      <a:prstDash val="solid"/>
+                      <a:round/>
+                      <a:headEnd type="none" w="med" len="med"/>
+                      <a:tailEnd type="none" w="med" len="med"/>
+                    </a:lnT>
+                    <a:lnB w="12700" cap="flat" cmpd="sng" algn="ctr">
+                      <a:solidFill>
+                        <a:schemeClr val="tx1"/>
+                      </a:solidFill>
+                      <a:prstDash val="solid"/>
+                      <a:round/>
+                      <a:headEnd type="none" w="med" len="med"/>
+                      <a:tailEnd type="none" w="med" len="med"/>
+                    </a:lnB>
+                    <a:solidFill>
+                      <a:schemeClr val="bg1"/>
+                    </a:solidFill>
+                  </a:tcPr>
+                </a:tc>
+                <a:tc>
+                  <a:txBody>
+                    <a:bodyPr/>
+                    <a:lstStyle/>
+                    <a:p>
+                      <a:endParaRPr lang="en-US"/>
+                    </a:p>
+                  </a:txBody>
+                  <a:tcPr>
+                    <a:lnL w="12700" cap="flat" cmpd="sng" algn="ctr">
+                      <a:solidFill>
+                        <a:schemeClr val="tx1"/>
+                      </a:solidFill>
+                      <a:prstDash val="solid"/>
+                      <a:round/>
+                      <a:headEnd type="none" w="med" len="med"/>
+                      <a:tailEnd type="none" w="med" len="med"/>
+                    </a:lnL>
+                    <a:lnR w="12700" cap="flat" cmpd="sng" algn="ctr">
+                      <a:solidFill>
+                        <a:schemeClr val="tx1"/>
+                      </a:solidFill>
+                      <a:prstDash val="solid"/>
+                      <a:round/>
+                      <a:headEnd type="none" w="med" len="med"/>
+                      <a:tailEnd type="none" w="med" len="med"/>
+                    </a:lnR>
+                    <a:lnT w="12700" cap="flat" cmpd="sng" algn="ctr">
+                      <a:solidFill>
+                        <a:schemeClr val="tx1"/>
+                      </a:solidFill>
+                      <a:prstDash val="solid"/>
+                      <a:round/>
+                      <a:headEnd type="none" w="med" len="med"/>
+                      <a:tailEnd type="none" w="med" len="med"/>
+                    </a:lnT>
+                    <a:lnB w="12700" cap="flat" cmpd="sng" algn="ctr">
+                      <a:solidFill>
+                        <a:schemeClr val="tx1"/>
+                      </a:solidFill>
+                      <a:prstDash val="solid"/>
+                      <a:round/>
+                      <a:headEnd type="none" w="med" len="med"/>
+                      <a:tailEnd type="none" w="med" len="med"/>
+                    </a:lnB>
+                    <a:solidFill>
+                      <a:schemeClr val="bg1"/>
+                    </a:solidFill>
+                  </a:tcPr>
+                </a:tc>
+                <a:tc>
+                  <a:txBody>
+                    <a:bodyPr/>
+                    <a:lstStyle/>
+                    <a:p>
+                      <a:endParaRPr lang="en-US"/>
+                    </a:p>
+                  </a:txBody>
+                  <a:tcPr>
+                    <a:lnL w="12700" cap="flat" cmpd="sng" algn="ctr">
+                      <a:solidFill>
+                        <a:schemeClr val="tx1"/>
+                      </a:solidFill>
+                      <a:prstDash val="solid"/>
+                      <a:round/>
+                      <a:headEnd type="none" w="med" len="med"/>
+                      <a:tailEnd type="none" w="med" len="med"/>
+                    </a:lnL>
+                    <a:lnR w="12700" cap="flat" cmpd="sng" algn="ctr">
+                      <a:solidFill>
+                        <a:schemeClr val="tx1"/>
+                      </a:solidFill>
+                      <a:prstDash val="solid"/>
+                      <a:round/>
+                      <a:headEnd type="none" w="med" len="med"/>
+                      <a:tailEnd type="none" w="med" len="med"/>
+                    </a:lnR>
+                    <a:lnT w="12700" cap="flat" cmpd="sng" algn="ctr">
+                      <a:solidFill>
+                        <a:schemeClr val="tx1"/>
+                      </a:solidFill>
+                      <a:prstDash val="solid"/>
+                      <a:round/>
+                      <a:headEnd type="none" w="med" len="med"/>
+                      <a:tailEnd type="none" w="med" len="med"/>
+                    </a:lnT>
+                    <a:lnB w="12700" cap="flat" cmpd="sng" algn="ctr">
+                      <a:solidFill>
+                        <a:schemeClr val="tx1"/>
+                      </a:solidFill>
+                      <a:prstDash val="solid"/>
+                      <a:round/>
+                      <a:headEnd type="none" w="med" len="med"/>
+                      <a:tailEnd type="none" w="med" len="med"/>
+                    </a:lnB>
+                    <a:solidFill>
+                      <a:schemeClr val="bg1"/>
+                    </a:solidFill>
+                  </a:tcPr>
+                </a:tc>
+                <a:extLst>
+                  <a:ext uri="{0D108BD9-81ED-4DB2-BD59-A6C34878D82A}">
+                    <a16:rowId xmlns:a16="http://schemas.microsoft.com/office/drawing/2014/main" val="2613011607"/>
+                  </a:ext>
+                </a:extLst>
+              </a:tr>
+              <a:tr h="810587">
+                <a:tc>
+                  <a:txBody>
+                    <a:bodyPr/>
+                    <a:lstStyle/>
+                    <a:p>
+                      <a:endParaRPr lang="en-US" dirty="0"/>
+                    </a:p>
+                  </a:txBody>
+                  <a:tcPr>
+                    <a:lnL w="12700" cap="flat" cmpd="sng" algn="ctr">
+                      <a:solidFill>
+                        <a:schemeClr val="tx1"/>
+                      </a:solidFill>
+                      <a:prstDash val="solid"/>
+                      <a:round/>
+                      <a:headEnd type="none" w="med" len="med"/>
+                      <a:tailEnd type="none" w="med" len="med"/>
+                    </a:lnL>
+                    <a:lnR w="12700" cap="flat" cmpd="sng" algn="ctr">
+                      <a:solidFill>
+                        <a:schemeClr val="tx1"/>
+                      </a:solidFill>
+                      <a:prstDash val="solid"/>
+                      <a:round/>
+                      <a:headEnd type="none" w="med" len="med"/>
+                      <a:tailEnd type="none" w="med" len="med"/>
+                    </a:lnR>
+                    <a:lnT w="12700" cap="flat" cmpd="sng" algn="ctr">
+                      <a:solidFill>
+                        <a:schemeClr val="tx1"/>
+                      </a:solidFill>
+                      <a:prstDash val="solid"/>
+                      <a:round/>
+                      <a:headEnd type="none" w="med" len="med"/>
+                      <a:tailEnd type="none" w="med" len="med"/>
+                    </a:lnT>
+                    <a:lnB w="12700" cap="flat" cmpd="sng" algn="ctr">
+                      <a:solidFill>
+                        <a:schemeClr val="tx1"/>
+                      </a:solidFill>
+                      <a:prstDash val="solid"/>
+                      <a:round/>
+                      <a:headEnd type="none" w="med" len="med"/>
+                      <a:tailEnd type="none" w="med" len="med"/>
+                    </a:lnB>
+                    <a:solidFill>
+                      <a:schemeClr val="bg1"/>
+                    </a:solidFill>
+                  </a:tcPr>
+                </a:tc>
+                <a:tc>
+                  <a:txBody>
+                    <a:bodyPr/>
+                    <a:lstStyle/>
+                    <a:p>
+                      <a:endParaRPr lang="en-US" dirty="0"/>
+                    </a:p>
+                  </a:txBody>
+                  <a:tcPr>
+                    <a:lnL w="12700" cap="flat" cmpd="sng" algn="ctr">
+                      <a:solidFill>
+                        <a:schemeClr val="tx1"/>
+                      </a:solidFill>
+                      <a:prstDash val="solid"/>
+                      <a:round/>
+                      <a:headEnd type="none" w="med" len="med"/>
+                      <a:tailEnd type="none" w="med" len="med"/>
+                    </a:lnL>
+                    <a:lnR w="12700" cap="flat" cmpd="sng" algn="ctr">
+                      <a:solidFill>
+                        <a:schemeClr val="tx1"/>
+                      </a:solidFill>
+                      <a:prstDash val="solid"/>
+                      <a:round/>
+                      <a:headEnd type="none" w="med" len="med"/>
+                      <a:tailEnd type="none" w="med" len="med"/>
+                    </a:lnR>
+                    <a:lnT w="12700" cap="flat" cmpd="sng" algn="ctr">
+                      <a:solidFill>
+                        <a:schemeClr val="tx1"/>
+                      </a:solidFill>
+                      <a:prstDash val="solid"/>
+                      <a:round/>
+                      <a:headEnd type="none" w="med" len="med"/>
+                      <a:tailEnd type="none" w="med" len="med"/>
+                    </a:lnT>
+                    <a:lnB w="12700" cap="flat" cmpd="sng" algn="ctr">
+                      <a:solidFill>
+                        <a:schemeClr val="tx1"/>
+                      </a:solidFill>
+                      <a:prstDash val="solid"/>
+                      <a:round/>
+                      <a:headEnd type="none" w="med" len="med"/>
+                      <a:tailEnd type="none" w="med" len="med"/>
+                    </a:lnB>
+                    <a:solidFill>
+                      <a:schemeClr val="bg1"/>
+                    </a:solidFill>
+                  </a:tcPr>
+                </a:tc>
+                <a:tc>
+                  <a:txBody>
+                    <a:bodyPr/>
+                    <a:lstStyle/>
+                    <a:p>
+                      <a:endParaRPr lang="en-US"/>
+                    </a:p>
+                  </a:txBody>
+                  <a:tcPr>
+                    <a:lnL w="12700" cap="flat" cmpd="sng" algn="ctr">
+                      <a:solidFill>
+                        <a:schemeClr val="tx1"/>
+                      </a:solidFill>
+                      <a:prstDash val="solid"/>
+                      <a:round/>
+                      <a:headEnd type="none" w="med" len="med"/>
+                      <a:tailEnd type="none" w="med" len="med"/>
+                    </a:lnL>
+                    <a:lnR w="12700" cap="flat" cmpd="sng" algn="ctr">
+                      <a:solidFill>
+                        <a:schemeClr val="tx1"/>
+                      </a:solidFill>
+                      <a:prstDash val="solid"/>
+                      <a:round/>
+                      <a:headEnd type="none" w="med" len="med"/>
+                      <a:tailEnd type="none" w="med" len="med"/>
+                    </a:lnR>
+                    <a:lnT w="12700" cap="flat" cmpd="sng" algn="ctr">
+                      <a:solidFill>
+                        <a:schemeClr val="tx1"/>
+                      </a:solidFill>
+                      <a:prstDash val="solid"/>
+                      <a:round/>
+                      <a:headEnd type="none" w="med" len="med"/>
+                      <a:tailEnd type="none" w="med" len="med"/>
+                    </a:lnT>
+                    <a:lnB w="12700" cap="flat" cmpd="sng" algn="ctr">
+                      <a:solidFill>
+                        <a:schemeClr val="tx1"/>
+                      </a:solidFill>
+                      <a:prstDash val="solid"/>
+                      <a:round/>
+                      <a:headEnd type="none" w="med" len="med"/>
+                      <a:tailEnd type="none" w="med" len="med"/>
+                    </a:lnB>
+                    <a:solidFill>
+                      <a:schemeClr val="bg1"/>
+                    </a:solidFill>
+                  </a:tcPr>
+                </a:tc>
+                <a:tc>
+                  <a:txBody>
+                    <a:bodyPr/>
+                    <a:lstStyle/>
+                    <a:p>
+                      <a:endParaRPr lang="en-US"/>
+                    </a:p>
+                  </a:txBody>
+                  <a:tcPr>
+                    <a:lnL w="12700" cap="flat" cmpd="sng" algn="ctr">
+                      <a:solidFill>
+                        <a:schemeClr val="tx1"/>
+                      </a:solidFill>
+                      <a:prstDash val="solid"/>
+                      <a:round/>
+                      <a:headEnd type="none" w="med" len="med"/>
+                      <a:tailEnd type="none" w="med" len="med"/>
+                    </a:lnL>
+                    <a:lnR w="12700" cap="flat" cmpd="sng" algn="ctr">
+                      <a:solidFill>
+                        <a:schemeClr val="tx1"/>
+                      </a:solidFill>
+                      <a:prstDash val="solid"/>
+                      <a:round/>
+                      <a:headEnd type="none" w="med" len="med"/>
+                      <a:tailEnd type="none" w="med" len="med"/>
+                    </a:lnR>
+                    <a:lnT w="12700" cap="flat" cmpd="sng" algn="ctr">
+                      <a:solidFill>
+                        <a:schemeClr val="tx1"/>
+                      </a:solidFill>
+                      <a:prstDash val="solid"/>
+                      <a:round/>
+                      <a:headEnd type="none" w="med" len="med"/>
+                      <a:tailEnd type="none" w="med" len="med"/>
+                    </a:lnT>
+                    <a:lnB w="12700" cap="flat" cmpd="sng" algn="ctr">
+                      <a:solidFill>
+                        <a:schemeClr val="tx1"/>
+                      </a:solidFill>
+                      <a:prstDash val="solid"/>
+                      <a:round/>
+                      <a:headEnd type="none" w="med" len="med"/>
+                      <a:tailEnd type="none" w="med" len="med"/>
+                    </a:lnB>
+                    <a:solidFill>
+                      <a:schemeClr val="bg1"/>
+                    </a:solidFill>
+                  </a:tcPr>
+                </a:tc>
+                <a:tc>
+                  <a:txBody>
+                    <a:bodyPr/>
+                    <a:lstStyle/>
+                    <a:p>
+                      <a:endParaRPr lang="en-US" dirty="0"/>
+                    </a:p>
+                  </a:txBody>
+                  <a:tcPr>
+                    <a:lnL w="12700" cap="flat" cmpd="sng" algn="ctr">
+                      <a:solidFill>
+                        <a:schemeClr val="tx1"/>
+                      </a:solidFill>
+                      <a:prstDash val="solid"/>
+                      <a:round/>
+                      <a:headEnd type="none" w="med" len="med"/>
+                      <a:tailEnd type="none" w="med" len="med"/>
+                    </a:lnL>
+                    <a:lnR w="12700" cap="flat" cmpd="sng" algn="ctr">
+                      <a:solidFill>
+                        <a:schemeClr val="tx1"/>
+                      </a:solidFill>
+                      <a:prstDash val="solid"/>
+                      <a:round/>
+                      <a:headEnd type="none" w="med" len="med"/>
+                      <a:tailEnd type="none" w="med" len="med"/>
+                    </a:lnR>
+                    <a:lnT w="12700" cap="flat" cmpd="sng" algn="ctr">
+                      <a:solidFill>
+                        <a:schemeClr val="tx1"/>
+                      </a:solidFill>
+                      <a:prstDash val="solid"/>
+                      <a:round/>
+                      <a:headEnd type="none" w="med" len="med"/>
+                      <a:tailEnd type="none" w="med" len="med"/>
+                    </a:lnT>
+                    <a:lnB w="12700" cap="flat" cmpd="sng" algn="ctr">
+                      <a:solidFill>
+                        <a:schemeClr val="tx1"/>
+                      </a:solidFill>
+                      <a:prstDash val="solid"/>
+                      <a:round/>
+                      <a:headEnd type="none" w="med" len="med"/>
+                      <a:tailEnd type="none" w="med" len="med"/>
+                    </a:lnB>
+                    <a:solidFill>
+                      <a:schemeClr val="bg1"/>
+                    </a:solidFill>
+                  </a:tcPr>
+                </a:tc>
+                <a:tc>
+                  <a:txBody>
+                    <a:bodyPr/>
+                    <a:lstStyle/>
+                    <a:p>
+                      <a:endParaRPr lang="en-US" dirty="0"/>
+                    </a:p>
+                  </a:txBody>
+                  <a:tcPr>
+                    <a:lnL w="12700" cap="flat" cmpd="sng" algn="ctr">
+                      <a:solidFill>
+                        <a:schemeClr val="tx1"/>
+                      </a:solidFill>
+                      <a:prstDash val="solid"/>
+                      <a:round/>
+                      <a:headEnd type="none" w="med" len="med"/>
+                      <a:tailEnd type="none" w="med" len="med"/>
+                    </a:lnL>
+                    <a:lnR w="12700" cap="flat" cmpd="sng" algn="ctr">
+                      <a:solidFill>
+                        <a:schemeClr val="tx1"/>
+                      </a:solidFill>
+                      <a:prstDash val="solid"/>
+                      <a:round/>
+                      <a:headEnd type="none" w="med" len="med"/>
+                      <a:tailEnd type="none" w="med" len="med"/>
+                    </a:lnR>
+                    <a:lnT w="12700" cap="flat" cmpd="sng" algn="ctr">
+                      <a:solidFill>
+                        <a:schemeClr val="tx1"/>
+                      </a:solidFill>
+                      <a:prstDash val="solid"/>
+                      <a:round/>
+                      <a:headEnd type="none" w="med" len="med"/>
+                      <a:tailEnd type="none" w="med" len="med"/>
+                    </a:lnT>
+                    <a:lnB w="12700" cap="flat" cmpd="sng" algn="ctr">
+                      <a:solidFill>
+                        <a:schemeClr val="tx1"/>
+                      </a:solidFill>
+                      <a:prstDash val="solid"/>
+                      <a:round/>
+                      <a:headEnd type="none" w="med" len="med"/>
+                      <a:tailEnd type="none" w="med" len="med"/>
+                    </a:lnB>
+                    <a:solidFill>
+                      <a:schemeClr val="bg1"/>
+                    </a:solidFill>
+                  </a:tcPr>
+                </a:tc>
+                <a:tc>
+                  <a:txBody>
+                    <a:bodyPr/>
+                    <a:lstStyle/>
+                    <a:p>
+                      <a:endParaRPr lang="en-US"/>
+                    </a:p>
+                  </a:txBody>
+                  <a:tcPr>
+                    <a:lnL w="12700" cap="flat" cmpd="sng" algn="ctr">
+                      <a:solidFill>
+                        <a:schemeClr val="tx1"/>
+                      </a:solidFill>
+                      <a:prstDash val="solid"/>
+                      <a:round/>
+                      <a:headEnd type="none" w="med" len="med"/>
+                      <a:tailEnd type="none" w="med" len="med"/>
+                    </a:lnL>
+                    <a:lnR w="12700" cap="flat" cmpd="sng" algn="ctr">
+                      <a:solidFill>
+                        <a:schemeClr val="tx1"/>
+                      </a:solidFill>
+                      <a:prstDash val="solid"/>
+                      <a:round/>
+                      <a:headEnd type="none" w="med" len="med"/>
+                      <a:tailEnd type="none" w="med" len="med"/>
+                    </a:lnR>
+                    <a:lnT w="12700" cap="flat" cmpd="sng" algn="ctr">
+                      <a:solidFill>
+                        <a:schemeClr val="tx1"/>
+                      </a:solidFill>
+                      <a:prstDash val="solid"/>
+                      <a:round/>
+                      <a:headEnd type="none" w="med" len="med"/>
+                      <a:tailEnd type="none" w="med" len="med"/>
+                    </a:lnT>
+                    <a:lnB w="12700" cap="flat" cmpd="sng" algn="ctr">
+                      <a:solidFill>
+                        <a:schemeClr val="tx1"/>
+                      </a:solidFill>
+                      <a:prstDash val="solid"/>
+                      <a:round/>
+                      <a:headEnd type="none" w="med" len="med"/>
+                      <a:tailEnd type="none" w="med" len="med"/>
+                    </a:lnB>
+                    <a:solidFill>
+                      <a:schemeClr val="bg1"/>
+                    </a:solidFill>
+                  </a:tcPr>
+                </a:tc>
+                <a:tc>
+                  <a:txBody>
+                    <a:bodyPr/>
+                    <a:lstStyle/>
+                    <a:p>
+                      <a:endParaRPr lang="en-US"/>
+                    </a:p>
+                  </a:txBody>
+                  <a:tcPr>
+                    <a:lnL w="12700" cap="flat" cmpd="sng" algn="ctr">
+                      <a:solidFill>
+                        <a:schemeClr val="tx1"/>
+                      </a:solidFill>
+                      <a:prstDash val="solid"/>
+                      <a:round/>
+                      <a:headEnd type="none" w="med" len="med"/>
+                      <a:tailEnd type="none" w="med" len="med"/>
+                    </a:lnL>
+                    <a:lnR w="12700" cap="flat" cmpd="sng" algn="ctr">
+                      <a:solidFill>
+                        <a:schemeClr val="tx1"/>
+                      </a:solidFill>
+                      <a:prstDash val="solid"/>
+                      <a:round/>
+                      <a:headEnd type="none" w="med" len="med"/>
+                      <a:tailEnd type="none" w="med" len="med"/>
+                    </a:lnR>
+                    <a:lnT w="12700" cap="flat" cmpd="sng" algn="ctr">
+                      <a:solidFill>
+                        <a:schemeClr val="tx1"/>
+                      </a:solidFill>
+                      <a:prstDash val="solid"/>
+                      <a:round/>
+                      <a:headEnd type="none" w="med" len="med"/>
+                      <a:tailEnd type="none" w="med" len="med"/>
+                    </a:lnT>
+                    <a:lnB w="12700" cap="flat" cmpd="sng" algn="ctr">
+                      <a:solidFill>
+                        <a:schemeClr val="tx1"/>
+                      </a:solidFill>
+                      <a:prstDash val="solid"/>
+                      <a:round/>
+                      <a:headEnd type="none" w="med" len="med"/>
+                      <a:tailEnd type="none" w="med" len="med"/>
+                    </a:lnB>
+                    <a:solidFill>
+                      <a:schemeClr val="bg1"/>
+                    </a:solidFill>
+                  </a:tcPr>
+                </a:tc>
+                <a:extLst>
+                  <a:ext uri="{0D108BD9-81ED-4DB2-BD59-A6C34878D82A}">
+                    <a16:rowId xmlns:a16="http://schemas.microsoft.com/office/drawing/2014/main" val="2680860295"/>
+                  </a:ext>
+                </a:extLst>
+              </a:tr>
+              <a:tr h="810587">
+                <a:tc>
+                  <a:txBody>
+                    <a:bodyPr/>
+                    <a:lstStyle/>
+                    <a:p>
+                      <a:endParaRPr lang="en-US" dirty="0"/>
+                    </a:p>
+                  </a:txBody>
+                  <a:tcPr>
+                    <a:lnL w="12700" cap="flat" cmpd="sng" algn="ctr">
+                      <a:solidFill>
+                        <a:schemeClr val="tx1"/>
+                      </a:solidFill>
+                      <a:prstDash val="solid"/>
+                      <a:round/>
+                      <a:headEnd type="none" w="med" len="med"/>
+                      <a:tailEnd type="none" w="med" len="med"/>
+                    </a:lnL>
+                    <a:lnR w="12700" cap="flat" cmpd="sng" algn="ctr">
+                      <a:solidFill>
+                        <a:schemeClr val="tx1"/>
+                      </a:solidFill>
+                      <a:prstDash val="solid"/>
+                      <a:round/>
+                      <a:headEnd type="none" w="med" len="med"/>
+                      <a:tailEnd type="none" w="med" len="med"/>
+                    </a:lnR>
+                    <a:lnT w="12700" cap="flat" cmpd="sng" algn="ctr">
+                      <a:solidFill>
+                        <a:schemeClr val="tx1"/>
+                      </a:solidFill>
+                      <a:prstDash val="solid"/>
+                      <a:round/>
+                      <a:headEnd type="none" w="med" len="med"/>
+                      <a:tailEnd type="none" w="med" len="med"/>
+                    </a:lnT>
+                    <a:lnB w="12700" cap="flat" cmpd="sng" algn="ctr">
+                      <a:solidFill>
+                        <a:schemeClr val="tx1"/>
+                      </a:solidFill>
+                      <a:prstDash val="solid"/>
+                      <a:round/>
+                      <a:headEnd type="none" w="med" len="med"/>
+                      <a:tailEnd type="none" w="med" len="med"/>
+                    </a:lnB>
+                    <a:solidFill>
+                      <a:schemeClr val="bg1"/>
+                    </a:solidFill>
+                  </a:tcPr>
+                </a:tc>
+                <a:tc>
+                  <a:txBody>
+                    <a:bodyPr/>
+                    <a:lstStyle/>
+                    <a:p>
+                      <a:endParaRPr lang="en-US"/>
+                    </a:p>
+                  </a:txBody>
+                  <a:tcPr>
+                    <a:lnL w="12700" cap="flat" cmpd="sng" algn="ctr">
+                      <a:solidFill>
+                        <a:schemeClr val="tx1"/>
+                      </a:solidFill>
+                      <a:prstDash val="solid"/>
+                      <a:round/>
+                      <a:headEnd type="none" w="med" len="med"/>
+                      <a:tailEnd type="none" w="med" len="med"/>
+                    </a:lnL>
+                    <a:lnR w="12700" cap="flat" cmpd="sng" algn="ctr">
+                      <a:solidFill>
+                        <a:schemeClr val="tx1"/>
+                      </a:solidFill>
+                      <a:prstDash val="solid"/>
+                      <a:round/>
+                      <a:headEnd type="none" w="med" len="med"/>
+                      <a:tailEnd type="none" w="med" len="med"/>
+                    </a:lnR>
+                    <a:lnT w="12700" cap="flat" cmpd="sng" algn="ctr">
+                      <a:solidFill>
+                        <a:schemeClr val="tx1"/>
+                      </a:solidFill>
+                      <a:prstDash val="solid"/>
+                      <a:round/>
+                      <a:headEnd type="none" w="med" len="med"/>
+                      <a:tailEnd type="none" w="med" len="med"/>
+                    </a:lnT>
+                    <a:lnB w="12700" cap="flat" cmpd="sng" algn="ctr">
+                      <a:solidFill>
+                        <a:schemeClr val="tx1"/>
+                      </a:solidFill>
+                      <a:prstDash val="solid"/>
+                      <a:round/>
+                      <a:headEnd type="none" w="med" len="med"/>
+                      <a:tailEnd type="none" w="med" len="med"/>
+                    </a:lnB>
+                    <a:solidFill>
+                      <a:schemeClr val="bg1"/>
+                    </a:solidFill>
+                  </a:tcPr>
+                </a:tc>
+                <a:tc>
+                  <a:txBody>
+                    <a:bodyPr/>
+                    <a:lstStyle/>
+                    <a:p>
+                      <a:endParaRPr lang="en-US" dirty="0"/>
+                    </a:p>
+                  </a:txBody>
+                  <a:tcPr>
+                    <a:lnL w="12700" cap="flat" cmpd="sng" algn="ctr">
+                      <a:solidFill>
+                        <a:schemeClr val="tx1"/>
+                      </a:solidFill>
+                      <a:prstDash val="solid"/>
+                      <a:round/>
+                      <a:headEnd type="none" w="med" len="med"/>
+                      <a:tailEnd type="none" w="med" len="med"/>
+                    </a:lnL>
+                    <a:lnR w="12700" cap="flat" cmpd="sng" algn="ctr">
+                      <a:solidFill>
+                        <a:schemeClr val="tx1"/>
+                      </a:solidFill>
+                      <a:prstDash val="solid"/>
+                      <a:round/>
+                      <a:headEnd type="none" w="med" len="med"/>
+                      <a:tailEnd type="none" w="med" len="med"/>
+                    </a:lnR>
+                    <a:lnT w="12700" cap="flat" cmpd="sng" algn="ctr">
+                      <a:solidFill>
+                        <a:schemeClr val="tx1"/>
+                      </a:solidFill>
+                      <a:prstDash val="solid"/>
+                      <a:round/>
+                      <a:headEnd type="none" w="med" len="med"/>
+                      <a:tailEnd type="none" w="med" len="med"/>
+                    </a:lnT>
+                    <a:lnB w="12700" cap="flat" cmpd="sng" algn="ctr">
+                      <a:solidFill>
+                        <a:schemeClr val="tx1"/>
+                      </a:solidFill>
+                      <a:prstDash val="solid"/>
+                      <a:round/>
+                      <a:headEnd type="none" w="med" len="med"/>
+                      <a:tailEnd type="none" w="med" len="med"/>
+                    </a:lnB>
+                    <a:solidFill>
+                      <a:schemeClr val="bg1"/>
+                    </a:solidFill>
+                  </a:tcPr>
+                </a:tc>
+                <a:tc>
+                  <a:txBody>
+                    <a:bodyPr/>
+                    <a:lstStyle/>
+                    <a:p>
+                      <a:endParaRPr lang="en-US" dirty="0"/>
+                    </a:p>
+                  </a:txBody>
+                  <a:tcPr>
+                    <a:lnL w="12700" cap="flat" cmpd="sng" algn="ctr">
+                      <a:solidFill>
+                        <a:schemeClr val="tx1"/>
+                      </a:solidFill>
+                      <a:prstDash val="solid"/>
+                      <a:round/>
+                      <a:headEnd type="none" w="med" len="med"/>
+                      <a:tailEnd type="none" w="med" len="med"/>
+                    </a:lnL>
+                    <a:lnR w="12700" cap="flat" cmpd="sng" algn="ctr">
+                      <a:solidFill>
+                        <a:schemeClr val="tx1"/>
+                      </a:solidFill>
+                      <a:prstDash val="solid"/>
+                      <a:round/>
+                      <a:headEnd type="none" w="med" len="med"/>
+                      <a:tailEnd type="none" w="med" len="med"/>
+                    </a:lnR>
+                    <a:lnT w="12700" cap="flat" cmpd="sng" algn="ctr">
+                      <a:solidFill>
+                        <a:schemeClr val="tx1"/>
+                      </a:solidFill>
+                      <a:prstDash val="solid"/>
+                      <a:round/>
+                      <a:headEnd type="none" w="med" len="med"/>
+                      <a:tailEnd type="none" w="med" len="med"/>
+                    </a:lnT>
+                    <a:lnB w="12700" cap="flat" cmpd="sng" algn="ctr">
+                      <a:solidFill>
+                        <a:schemeClr val="tx1"/>
+                      </a:solidFill>
+                      <a:prstDash val="solid"/>
+                      <a:round/>
+                      <a:headEnd type="none" w="med" len="med"/>
+                      <a:tailEnd type="none" w="med" len="med"/>
+                    </a:lnB>
+                    <a:solidFill>
+                      <a:schemeClr val="bg1"/>
+                    </a:solidFill>
+                  </a:tcPr>
+                </a:tc>
+                <a:tc>
+                  <a:txBody>
+                    <a:bodyPr/>
+                    <a:lstStyle/>
+                    <a:p>
+                      <a:endParaRPr lang="en-US"/>
+                    </a:p>
+                  </a:txBody>
+                  <a:tcPr>
+                    <a:lnL w="12700" cap="flat" cmpd="sng" algn="ctr">
+                      <a:solidFill>
+                        <a:schemeClr val="tx1"/>
+                      </a:solidFill>
+                      <a:prstDash val="solid"/>
+                      <a:round/>
+                      <a:headEnd type="none" w="med" len="med"/>
+                      <a:tailEnd type="none" w="med" len="med"/>
+                    </a:lnL>
+                    <a:lnR w="12700" cap="flat" cmpd="sng" algn="ctr">
+                      <a:solidFill>
+                        <a:schemeClr val="tx1"/>
+                      </a:solidFill>
+                      <a:prstDash val="solid"/>
+                      <a:round/>
+                      <a:headEnd type="none" w="med" len="med"/>
+                      <a:tailEnd type="none" w="med" len="med"/>
+                    </a:lnR>
+                    <a:lnT w="12700" cap="flat" cmpd="sng" algn="ctr">
+                      <a:solidFill>
+                        <a:schemeClr val="tx1"/>
+                      </a:solidFill>
+                      <a:prstDash val="solid"/>
+                      <a:round/>
+                      <a:headEnd type="none" w="med" len="med"/>
+                      <a:tailEnd type="none" w="med" len="med"/>
+                    </a:lnT>
+                    <a:lnB w="12700" cap="flat" cmpd="sng" algn="ctr">
+                      <a:solidFill>
+                        <a:schemeClr val="tx1"/>
+                      </a:solidFill>
+                      <a:prstDash val="solid"/>
+                      <a:round/>
+                      <a:headEnd type="none" w="med" len="med"/>
+                      <a:tailEnd type="none" w="med" len="med"/>
+                    </a:lnB>
+                    <a:solidFill>
+                      <a:schemeClr val="bg1"/>
+                    </a:solidFill>
+                  </a:tcPr>
+                </a:tc>
+                <a:tc>
+                  <a:txBody>
+                    <a:bodyPr/>
+                    <a:lstStyle/>
+                    <a:p>
+                      <a:endParaRPr lang="en-US" dirty="0"/>
+                    </a:p>
+                  </a:txBody>
+                  <a:tcPr>
+                    <a:lnL w="12700" cap="flat" cmpd="sng" algn="ctr">
+                      <a:solidFill>
+                        <a:schemeClr val="tx1"/>
+                      </a:solidFill>
+                      <a:prstDash val="solid"/>
+                      <a:round/>
+                      <a:headEnd type="none" w="med" len="med"/>
+                      <a:tailEnd type="none" w="med" len="med"/>
+                    </a:lnL>
+                    <a:lnR w="12700" cap="flat" cmpd="sng" algn="ctr">
+                      <a:solidFill>
+                        <a:schemeClr val="tx1"/>
+                      </a:solidFill>
+                      <a:prstDash val="solid"/>
+                      <a:round/>
+                      <a:headEnd type="none" w="med" len="med"/>
+                      <a:tailEnd type="none" w="med" len="med"/>
+                    </a:lnR>
+                    <a:lnT w="12700" cap="flat" cmpd="sng" algn="ctr">
+                      <a:solidFill>
+                        <a:schemeClr val="tx1"/>
+                      </a:solidFill>
+                      <a:prstDash val="solid"/>
+                      <a:round/>
+                      <a:headEnd type="none" w="med" len="med"/>
+                      <a:tailEnd type="none" w="med" len="med"/>
+                    </a:lnT>
+                    <a:lnB w="12700" cap="flat" cmpd="sng" algn="ctr">
+                      <a:solidFill>
+                        <a:schemeClr val="tx1"/>
+                      </a:solidFill>
+                      <a:prstDash val="solid"/>
+                      <a:round/>
+                      <a:headEnd type="none" w="med" len="med"/>
+                      <a:tailEnd type="none" w="med" len="med"/>
+                    </a:lnB>
+                    <a:solidFill>
+                      <a:schemeClr val="bg1"/>
+                    </a:solidFill>
+                  </a:tcPr>
+                </a:tc>
+                <a:tc>
+                  <a:txBody>
+                    <a:bodyPr/>
+                    <a:lstStyle/>
+                    <a:p>
+                      <a:endParaRPr lang="en-US"/>
+                    </a:p>
+                  </a:txBody>
+                  <a:tcPr>
+                    <a:lnL w="12700" cap="flat" cmpd="sng" algn="ctr">
+                      <a:solidFill>
+                        <a:schemeClr val="tx1"/>
+                      </a:solidFill>
+                      <a:prstDash val="solid"/>
+                      <a:round/>
+                      <a:headEnd type="none" w="med" len="med"/>
+                      <a:tailEnd type="none" w="med" len="med"/>
+                    </a:lnL>
+                    <a:lnR w="12700" cap="flat" cmpd="sng" algn="ctr">
+                      <a:solidFill>
+                        <a:schemeClr val="tx1"/>
+                      </a:solidFill>
+                      <a:prstDash val="solid"/>
+                      <a:round/>
+                      <a:headEnd type="none" w="med" len="med"/>
+                      <a:tailEnd type="none" w="med" len="med"/>
+                    </a:lnR>
+                    <a:lnT w="12700" cap="flat" cmpd="sng" algn="ctr">
+                      <a:solidFill>
+                        <a:schemeClr val="tx1"/>
+                      </a:solidFill>
+                      <a:prstDash val="solid"/>
+                      <a:round/>
+                      <a:headEnd type="none" w="med" len="med"/>
+                      <a:tailEnd type="none" w="med" len="med"/>
+                    </a:lnT>
+                    <a:lnB w="12700" cap="flat" cmpd="sng" algn="ctr">
+                      <a:solidFill>
+                        <a:schemeClr val="tx1"/>
+                      </a:solidFill>
+                      <a:prstDash val="solid"/>
+                      <a:round/>
+                      <a:headEnd type="none" w="med" len="med"/>
+                      <a:tailEnd type="none" w="med" len="med"/>
+                    </a:lnB>
+                    <a:solidFill>
+                      <a:schemeClr val="bg1"/>
+                    </a:solidFill>
+                  </a:tcPr>
+                </a:tc>
+                <a:tc>
+                  <a:txBody>
+                    <a:bodyPr/>
+                    <a:lstStyle/>
+                    <a:p>
+                      <a:endParaRPr lang="en-US" dirty="0"/>
+                    </a:p>
+                  </a:txBody>
+                  <a:tcPr>
+                    <a:lnL w="12700" cap="flat" cmpd="sng" algn="ctr">
+                      <a:solidFill>
+                        <a:schemeClr val="tx1"/>
+                      </a:solidFill>
+                      <a:prstDash val="solid"/>
+                      <a:round/>
+                      <a:headEnd type="none" w="med" len="med"/>
+                      <a:tailEnd type="none" w="med" len="med"/>
+                    </a:lnL>
+                    <a:lnR w="12700" cap="flat" cmpd="sng" algn="ctr">
+                      <a:solidFill>
+                        <a:schemeClr val="tx1"/>
+                      </a:solidFill>
+                      <a:prstDash val="solid"/>
+                      <a:round/>
+                      <a:headEnd type="none" w="med" len="med"/>
+                      <a:tailEnd type="none" w="med" len="med"/>
+                    </a:lnR>
+                    <a:lnT w="12700" cap="flat" cmpd="sng" algn="ctr">
+                      <a:solidFill>
+                        <a:schemeClr val="tx1"/>
+                      </a:solidFill>
+                      <a:prstDash val="solid"/>
+                      <a:round/>
+                      <a:headEnd type="none" w="med" len="med"/>
+                      <a:tailEnd type="none" w="med" len="med"/>
+                    </a:lnT>
+                    <a:lnB w="12700" cap="flat" cmpd="sng" algn="ctr">
+                      <a:solidFill>
+                        <a:schemeClr val="tx1"/>
+                      </a:solidFill>
+                      <a:prstDash val="solid"/>
+                      <a:round/>
+                      <a:headEnd type="none" w="med" len="med"/>
+                      <a:tailEnd type="none" w="med" len="med"/>
+                    </a:lnB>
+                    <a:solidFill>
+                      <a:schemeClr val="bg1"/>
+                    </a:solidFill>
+                  </a:tcPr>
+                </a:tc>
+                <a:extLst>
+                  <a:ext uri="{0D108BD9-81ED-4DB2-BD59-A6C34878D82A}">
+                    <a16:rowId xmlns:a16="http://schemas.microsoft.com/office/drawing/2014/main" val="2513433296"/>
+                  </a:ext>
+                </a:extLst>
+              </a:tr>
+              <a:tr h="810587">
+                <a:tc>
+                  <a:txBody>
+                    <a:bodyPr/>
+                    <a:lstStyle/>
+                    <a:p>
+                      <a:endParaRPr lang="en-US"/>
+                    </a:p>
+                  </a:txBody>
+                  <a:tcPr>
+                    <a:lnL w="12700" cap="flat" cmpd="sng" algn="ctr">
+                      <a:solidFill>
+                        <a:schemeClr val="tx1"/>
+                      </a:solidFill>
+                      <a:prstDash val="solid"/>
+                      <a:round/>
+                      <a:headEnd type="none" w="med" len="med"/>
+                      <a:tailEnd type="none" w="med" len="med"/>
+                    </a:lnL>
+                    <a:lnR w="12700" cap="flat" cmpd="sng" algn="ctr">
+                      <a:solidFill>
+                        <a:schemeClr val="tx1"/>
+                      </a:solidFill>
+                      <a:prstDash val="solid"/>
+                      <a:round/>
+                      <a:headEnd type="none" w="med" len="med"/>
+                      <a:tailEnd type="none" w="med" len="med"/>
+                    </a:lnR>
+                    <a:lnT w="12700" cap="flat" cmpd="sng" algn="ctr">
+                      <a:solidFill>
+                        <a:schemeClr val="tx1"/>
+                      </a:solidFill>
+                      <a:prstDash val="solid"/>
+                      <a:round/>
+                      <a:headEnd type="none" w="med" len="med"/>
+                      <a:tailEnd type="none" w="med" len="med"/>
+                    </a:lnT>
+                    <a:lnB w="12700" cap="flat" cmpd="sng" algn="ctr">
+                      <a:solidFill>
+                        <a:schemeClr val="tx1"/>
+                      </a:solidFill>
+                      <a:prstDash val="solid"/>
+                      <a:round/>
+                      <a:headEnd type="none" w="med" len="med"/>
+                      <a:tailEnd type="none" w="med" len="med"/>
+                    </a:lnB>
+                    <a:solidFill>
+                      <a:schemeClr val="bg1"/>
+                    </a:solidFill>
+                  </a:tcPr>
+                </a:tc>
+                <a:tc>
+                  <a:txBody>
+                    <a:bodyPr/>
+                    <a:lstStyle/>
+                    <a:p>
+                      <a:endParaRPr lang="en-US" dirty="0"/>
+                    </a:p>
+                  </a:txBody>
+                  <a:tcPr>
+                    <a:lnL w="12700" cap="flat" cmpd="sng" algn="ctr">
+                      <a:solidFill>
+                        <a:schemeClr val="tx1"/>
+                      </a:solidFill>
+                      <a:prstDash val="solid"/>
+                      <a:round/>
+                      <a:headEnd type="none" w="med" len="med"/>
+                      <a:tailEnd type="none" w="med" len="med"/>
+                    </a:lnL>
+                    <a:lnR w="12700" cap="flat" cmpd="sng" algn="ctr">
+                      <a:solidFill>
+                        <a:schemeClr val="tx1"/>
+                      </a:solidFill>
+                      <a:prstDash val="solid"/>
+                      <a:round/>
+                      <a:headEnd type="none" w="med" len="med"/>
+                      <a:tailEnd type="none" w="med" len="med"/>
+                    </a:lnR>
+                    <a:lnT w="12700" cap="flat" cmpd="sng" algn="ctr">
+                      <a:solidFill>
+                        <a:schemeClr val="tx1"/>
+                      </a:solidFill>
+                      <a:prstDash val="solid"/>
+                      <a:round/>
+                      <a:headEnd type="none" w="med" len="med"/>
+                      <a:tailEnd type="none" w="med" len="med"/>
+                    </a:lnT>
+                    <a:lnB w="12700" cap="flat" cmpd="sng" algn="ctr">
+                      <a:solidFill>
+                        <a:schemeClr val="tx1"/>
+                      </a:solidFill>
+                      <a:prstDash val="solid"/>
+                      <a:round/>
+                      <a:headEnd type="none" w="med" len="med"/>
+                      <a:tailEnd type="none" w="med" len="med"/>
+                    </a:lnB>
+                    <a:solidFill>
+                      <a:schemeClr val="bg1"/>
+                    </a:solidFill>
+                  </a:tcPr>
+                </a:tc>
+                <a:tc>
+                  <a:txBody>
+                    <a:bodyPr/>
+                    <a:lstStyle/>
+                    <a:p>
+                      <a:endParaRPr lang="en-US"/>
+                    </a:p>
+                  </a:txBody>
+                  <a:tcPr>
+                    <a:lnL w="12700" cap="flat" cmpd="sng" algn="ctr">
+                      <a:solidFill>
+                        <a:schemeClr val="tx1"/>
+                      </a:solidFill>
+                      <a:prstDash val="solid"/>
+                      <a:round/>
+                      <a:headEnd type="none" w="med" len="med"/>
+                      <a:tailEnd type="none" w="med" len="med"/>
+                    </a:lnL>
+                    <a:lnR w="12700" cap="flat" cmpd="sng" algn="ctr">
+                      <a:solidFill>
+                        <a:schemeClr val="tx1"/>
+                      </a:solidFill>
+                      <a:prstDash val="solid"/>
+                      <a:round/>
+                      <a:headEnd type="none" w="med" len="med"/>
+                      <a:tailEnd type="none" w="med" len="med"/>
+                    </a:lnR>
+                    <a:lnT w="12700" cap="flat" cmpd="sng" algn="ctr">
+                      <a:solidFill>
+                        <a:schemeClr val="tx1"/>
+                      </a:solidFill>
+                      <a:prstDash val="solid"/>
+                      <a:round/>
+                      <a:headEnd type="none" w="med" len="med"/>
+                      <a:tailEnd type="none" w="med" len="med"/>
+                    </a:lnT>
+                    <a:lnB w="12700" cap="flat" cmpd="sng" algn="ctr">
+                      <a:solidFill>
+                        <a:schemeClr val="tx1"/>
+                      </a:solidFill>
+                      <a:prstDash val="solid"/>
+                      <a:round/>
+                      <a:headEnd type="none" w="med" len="med"/>
+                      <a:tailEnd type="none" w="med" len="med"/>
+                    </a:lnB>
+                    <a:solidFill>
+                      <a:schemeClr val="bg1"/>
+                    </a:solidFill>
+                  </a:tcPr>
+                </a:tc>
+                <a:tc>
+                  <a:txBody>
+                    <a:bodyPr/>
+                    <a:lstStyle/>
+                    <a:p>
+                      <a:endParaRPr lang="en-US" dirty="0"/>
+                    </a:p>
+                  </a:txBody>
+                  <a:tcPr>
+                    <a:lnL w="12700" cap="flat" cmpd="sng" algn="ctr">
+                      <a:solidFill>
+                        <a:schemeClr val="tx1"/>
+                      </a:solidFill>
+                      <a:prstDash val="solid"/>
+                      <a:round/>
+                      <a:headEnd type="none" w="med" len="med"/>
+                      <a:tailEnd type="none" w="med" len="med"/>
+                    </a:lnL>
+                    <a:lnR w="12700" cap="flat" cmpd="sng" algn="ctr">
+                      <a:solidFill>
+                        <a:schemeClr val="tx1"/>
+                      </a:solidFill>
+                      <a:prstDash val="solid"/>
+                      <a:round/>
+                      <a:headEnd type="none" w="med" len="med"/>
+                      <a:tailEnd type="none" w="med" len="med"/>
+                    </a:lnR>
+                    <a:lnT w="12700" cap="flat" cmpd="sng" algn="ctr">
+                      <a:solidFill>
+                        <a:schemeClr val="tx1"/>
+                      </a:solidFill>
+                      <a:prstDash val="solid"/>
+                      <a:round/>
+                      <a:headEnd type="none" w="med" len="med"/>
+                      <a:tailEnd type="none" w="med" len="med"/>
+                    </a:lnT>
+                    <a:lnB w="12700" cap="flat" cmpd="sng" algn="ctr">
+                      <a:solidFill>
+                        <a:schemeClr val="tx1"/>
+                      </a:solidFill>
+                      <a:prstDash val="solid"/>
+                      <a:round/>
+                      <a:headEnd type="none" w="med" len="med"/>
+                      <a:tailEnd type="none" w="med" len="med"/>
+                    </a:lnB>
+                    <a:solidFill>
+                      <a:schemeClr val="bg1"/>
+                    </a:solidFill>
+                  </a:tcPr>
+                </a:tc>
+                <a:tc>
+                  <a:txBody>
+                    <a:bodyPr/>
+                    <a:lstStyle/>
+                    <a:p>
+                      <a:endParaRPr lang="en-US" dirty="0"/>
+                    </a:p>
+                  </a:txBody>
+                  <a:tcPr>
+                    <a:lnL w="12700" cap="flat" cmpd="sng" algn="ctr">
+                      <a:solidFill>
+                        <a:schemeClr val="tx1"/>
+                      </a:solidFill>
+                      <a:prstDash val="solid"/>
+                      <a:round/>
+                      <a:headEnd type="none" w="med" len="med"/>
+                      <a:tailEnd type="none" w="med" len="med"/>
+                    </a:lnL>
+                    <a:lnR w="12700" cap="flat" cmpd="sng" algn="ctr">
+                      <a:solidFill>
+                        <a:schemeClr val="tx1"/>
+                      </a:solidFill>
+                      <a:prstDash val="solid"/>
+                      <a:round/>
+                      <a:headEnd type="none" w="med" len="med"/>
+                      <a:tailEnd type="none" w="med" len="med"/>
+                    </a:lnR>
+                    <a:lnT w="12700" cap="flat" cmpd="sng" algn="ctr">
+                      <a:solidFill>
+                        <a:schemeClr val="tx1"/>
+                      </a:solidFill>
+                      <a:prstDash val="solid"/>
+                      <a:round/>
+                      <a:headEnd type="none" w="med" len="med"/>
+                      <a:tailEnd type="none" w="med" len="med"/>
+                    </a:lnT>
+                    <a:lnB w="12700" cap="flat" cmpd="sng" algn="ctr">
+                      <a:solidFill>
+                        <a:schemeClr val="tx1"/>
+                      </a:solidFill>
+                      <a:prstDash val="solid"/>
+                      <a:round/>
+                      <a:headEnd type="none" w="med" len="med"/>
+                      <a:tailEnd type="none" w="med" len="med"/>
+                    </a:lnB>
+                    <a:solidFill>
+                      <a:schemeClr val="bg1"/>
+                    </a:solidFill>
+                  </a:tcPr>
+                </a:tc>
+                <a:tc>
+                  <a:txBody>
+                    <a:bodyPr/>
+                    <a:lstStyle/>
+                    <a:p>
+                      <a:endParaRPr lang="en-US" dirty="0"/>
+                    </a:p>
+                  </a:txBody>
+                  <a:tcPr>
+                    <a:lnL w="12700" cap="flat" cmpd="sng" algn="ctr">
+                      <a:solidFill>
+                        <a:schemeClr val="tx1"/>
+                      </a:solidFill>
+                      <a:prstDash val="solid"/>
+                      <a:round/>
+                      <a:headEnd type="none" w="med" len="med"/>
+                      <a:tailEnd type="none" w="med" len="med"/>
+                    </a:lnL>
+                    <a:lnR w="12700" cap="flat" cmpd="sng" algn="ctr">
+                      <a:solidFill>
+                        <a:schemeClr val="tx1"/>
+                      </a:solidFill>
+                      <a:prstDash val="solid"/>
+                      <a:round/>
+                      <a:headEnd type="none" w="med" len="med"/>
+                      <a:tailEnd type="none" w="med" len="med"/>
+                    </a:lnR>
+                    <a:lnT w="12700" cap="flat" cmpd="sng" algn="ctr">
+                      <a:solidFill>
+                        <a:schemeClr val="tx1"/>
+                      </a:solidFill>
+                      <a:prstDash val="solid"/>
+                      <a:round/>
+                      <a:headEnd type="none" w="med" len="med"/>
+                      <a:tailEnd type="none" w="med" len="med"/>
+                    </a:lnT>
+                    <a:lnB w="12700" cap="flat" cmpd="sng" algn="ctr">
+                      <a:solidFill>
+                        <a:schemeClr val="tx1"/>
+                      </a:solidFill>
+                      <a:prstDash val="solid"/>
+                      <a:round/>
+                      <a:headEnd type="none" w="med" len="med"/>
+                      <a:tailEnd type="none" w="med" len="med"/>
+                    </a:lnB>
+                    <a:solidFill>
+                      <a:schemeClr val="bg1"/>
+                    </a:solidFill>
+                  </a:tcPr>
+                </a:tc>
+                <a:tc>
+                  <a:txBody>
+                    <a:bodyPr/>
+                    <a:lstStyle/>
+                    <a:p>
+                      <a:endParaRPr lang="en-US"/>
+                    </a:p>
+                  </a:txBody>
+                  <a:tcPr>
+                    <a:lnL w="12700" cap="flat" cmpd="sng" algn="ctr">
+                      <a:solidFill>
+                        <a:schemeClr val="tx1"/>
+                      </a:solidFill>
+                      <a:prstDash val="solid"/>
+                      <a:round/>
+                      <a:headEnd type="none" w="med" len="med"/>
+                      <a:tailEnd type="none" w="med" len="med"/>
+                    </a:lnL>
+                    <a:lnR w="12700" cap="flat" cmpd="sng" algn="ctr">
+                      <a:solidFill>
+                        <a:schemeClr val="tx1"/>
+                      </a:solidFill>
+                      <a:prstDash val="solid"/>
+                      <a:round/>
+                      <a:headEnd type="none" w="med" len="med"/>
+                      <a:tailEnd type="none" w="med" len="med"/>
+                    </a:lnR>
+                    <a:lnT w="12700" cap="flat" cmpd="sng" algn="ctr">
+                      <a:solidFill>
+                        <a:schemeClr val="tx1"/>
+                      </a:solidFill>
+                      <a:prstDash val="solid"/>
+                      <a:round/>
+                      <a:headEnd type="none" w="med" len="med"/>
+                      <a:tailEnd type="none" w="med" len="med"/>
+                    </a:lnT>
+                    <a:lnB w="12700" cap="flat" cmpd="sng" algn="ctr">
+                      <a:solidFill>
+                        <a:schemeClr val="tx1"/>
+                      </a:solidFill>
+                      <a:prstDash val="solid"/>
+                      <a:round/>
+                      <a:headEnd type="none" w="med" len="med"/>
+                      <a:tailEnd type="none" w="med" len="med"/>
+                    </a:lnB>
+                    <a:solidFill>
+                      <a:schemeClr val="bg1"/>
+                    </a:solidFill>
+                  </a:tcPr>
+                </a:tc>
+                <a:tc>
+                  <a:txBody>
+                    <a:bodyPr/>
+                    <a:lstStyle/>
+                    <a:p>
+                      <a:endParaRPr lang="en-US"/>
+                    </a:p>
+                  </a:txBody>
+                  <a:tcPr>
+                    <a:lnL w="12700" cap="flat" cmpd="sng" algn="ctr">
+                      <a:solidFill>
+                        <a:schemeClr val="tx1"/>
+                      </a:solidFill>
+                      <a:prstDash val="solid"/>
+                      <a:round/>
+                      <a:headEnd type="none" w="med" len="med"/>
+                      <a:tailEnd type="none" w="med" len="med"/>
+                    </a:lnL>
+                    <a:lnR w="12700" cap="flat" cmpd="sng" algn="ctr">
+                      <a:solidFill>
+                        <a:schemeClr val="tx1"/>
+                      </a:solidFill>
+                      <a:prstDash val="solid"/>
+                      <a:round/>
+                      <a:headEnd type="none" w="med" len="med"/>
+                      <a:tailEnd type="none" w="med" len="med"/>
+                    </a:lnR>
+                    <a:lnT w="12700" cap="flat" cmpd="sng" algn="ctr">
+                      <a:solidFill>
+                        <a:schemeClr val="tx1"/>
+                      </a:solidFill>
+                      <a:prstDash val="solid"/>
+                      <a:round/>
+                      <a:headEnd type="none" w="med" len="med"/>
+                      <a:tailEnd type="none" w="med" len="med"/>
+                    </a:lnT>
+                    <a:lnB w="12700" cap="flat" cmpd="sng" algn="ctr">
+                      <a:solidFill>
+                        <a:schemeClr val="tx1"/>
+                      </a:solidFill>
+                      <a:prstDash val="solid"/>
+                      <a:round/>
+                      <a:headEnd type="none" w="med" len="med"/>
+                      <a:tailEnd type="none" w="med" len="med"/>
+                    </a:lnB>
+                    <a:solidFill>
+                      <a:schemeClr val="bg1"/>
+                    </a:solidFill>
+                  </a:tcPr>
+                </a:tc>
+                <a:extLst>
+                  <a:ext uri="{0D108BD9-81ED-4DB2-BD59-A6C34878D82A}">
+                    <a16:rowId xmlns:a16="http://schemas.microsoft.com/office/drawing/2014/main" val="596558019"/>
+                  </a:ext>
+                </a:extLst>
+              </a:tr>
+              <a:tr h="810587">
+                <a:tc>
+                  <a:txBody>
+                    <a:bodyPr/>
+                    <a:lstStyle/>
+                    <a:p>
+                      <a:endParaRPr lang="en-US"/>
+                    </a:p>
+                  </a:txBody>
+                  <a:tcPr>
+                    <a:lnL w="12700" cap="flat" cmpd="sng" algn="ctr">
+                      <a:solidFill>
+                        <a:schemeClr val="tx1"/>
+                      </a:solidFill>
+                      <a:prstDash val="solid"/>
+                      <a:round/>
+                      <a:headEnd type="none" w="med" len="med"/>
+                      <a:tailEnd type="none" w="med" len="med"/>
+                    </a:lnL>
+                    <a:lnR w="12700" cap="flat" cmpd="sng" algn="ctr">
+                      <a:solidFill>
+                        <a:schemeClr val="tx1"/>
+                      </a:solidFill>
+                      <a:prstDash val="solid"/>
+                      <a:round/>
+                      <a:headEnd type="none" w="med" len="med"/>
+                      <a:tailEnd type="none" w="med" len="med"/>
+                    </a:lnR>
+                    <a:lnT w="12700" cap="flat" cmpd="sng" algn="ctr">
+                      <a:solidFill>
+                        <a:schemeClr val="tx1"/>
+                      </a:solidFill>
+                      <a:prstDash val="solid"/>
+                      <a:round/>
+                      <a:headEnd type="none" w="med" len="med"/>
+                      <a:tailEnd type="none" w="med" len="med"/>
+                    </a:lnT>
+                    <a:lnB w="12700" cap="flat" cmpd="sng" algn="ctr">
+                      <a:solidFill>
+                        <a:schemeClr val="tx1"/>
+                      </a:solidFill>
+                      <a:prstDash val="solid"/>
+                      <a:round/>
+                      <a:headEnd type="none" w="med" len="med"/>
+                      <a:tailEnd type="none" w="med" len="med"/>
+                    </a:lnB>
+                    <a:solidFill>
+                      <a:schemeClr val="bg1"/>
+                    </a:solidFill>
+                  </a:tcPr>
+                </a:tc>
+                <a:tc>
+                  <a:txBody>
+                    <a:bodyPr/>
+                    <a:lstStyle/>
+                    <a:p>
+                      <a:endParaRPr lang="en-US"/>
+                    </a:p>
+                  </a:txBody>
+                  <a:tcPr>
+                    <a:lnL w="12700" cap="flat" cmpd="sng" algn="ctr">
+                      <a:solidFill>
+                        <a:schemeClr val="tx1"/>
+                      </a:solidFill>
+                      <a:prstDash val="solid"/>
+                      <a:round/>
+                      <a:headEnd type="none" w="med" len="med"/>
+                      <a:tailEnd type="none" w="med" len="med"/>
+                    </a:lnL>
+                    <a:lnR w="12700" cap="flat" cmpd="sng" algn="ctr">
+                      <a:solidFill>
+                        <a:schemeClr val="tx1"/>
+                      </a:solidFill>
+                      <a:prstDash val="solid"/>
+                      <a:round/>
+                      <a:headEnd type="none" w="med" len="med"/>
+                      <a:tailEnd type="none" w="med" len="med"/>
+                    </a:lnR>
+                    <a:lnT w="12700" cap="flat" cmpd="sng" algn="ctr">
+                      <a:solidFill>
+                        <a:schemeClr val="tx1"/>
+                      </a:solidFill>
+                      <a:prstDash val="solid"/>
+                      <a:round/>
+                      <a:headEnd type="none" w="med" len="med"/>
+                      <a:tailEnd type="none" w="med" len="med"/>
+                    </a:lnT>
+                    <a:lnB w="12700" cap="flat" cmpd="sng" algn="ctr">
+                      <a:solidFill>
+                        <a:schemeClr val="tx1"/>
+                      </a:solidFill>
+                      <a:prstDash val="solid"/>
+                      <a:round/>
+                      <a:headEnd type="none" w="med" len="med"/>
+                      <a:tailEnd type="none" w="med" len="med"/>
+                    </a:lnB>
+                    <a:solidFill>
+                      <a:schemeClr val="bg1"/>
+                    </a:solidFill>
+                  </a:tcPr>
+                </a:tc>
+                <a:tc>
+                  <a:txBody>
+                    <a:bodyPr/>
+                    <a:lstStyle/>
+                    <a:p>
+                      <a:endParaRPr lang="en-US" dirty="0"/>
+                    </a:p>
+                  </a:txBody>
+                  <a:tcPr>
+                    <a:lnL w="12700" cap="flat" cmpd="sng" algn="ctr">
+                      <a:solidFill>
+                        <a:schemeClr val="tx1"/>
+                      </a:solidFill>
+                      <a:prstDash val="solid"/>
+                      <a:round/>
+                      <a:headEnd type="none" w="med" len="med"/>
+                      <a:tailEnd type="none" w="med" len="med"/>
+                    </a:lnL>
+                    <a:lnR w="12700" cap="flat" cmpd="sng" algn="ctr">
+                      <a:solidFill>
+                        <a:schemeClr val="tx1"/>
+                      </a:solidFill>
+                      <a:prstDash val="solid"/>
+                      <a:round/>
+                      <a:headEnd type="none" w="med" len="med"/>
+                      <a:tailEnd type="none" w="med" len="med"/>
+                    </a:lnR>
+                    <a:lnT w="12700" cap="flat" cmpd="sng" algn="ctr">
+                      <a:solidFill>
+                        <a:schemeClr val="tx1"/>
+                      </a:solidFill>
+                      <a:prstDash val="solid"/>
+                      <a:round/>
+                      <a:headEnd type="none" w="med" len="med"/>
+                      <a:tailEnd type="none" w="med" len="med"/>
+                    </a:lnT>
+                    <a:lnB w="12700" cap="flat" cmpd="sng" algn="ctr">
+                      <a:solidFill>
+                        <a:schemeClr val="tx1"/>
+                      </a:solidFill>
+                      <a:prstDash val="solid"/>
+                      <a:round/>
+                      <a:headEnd type="none" w="med" len="med"/>
+                      <a:tailEnd type="none" w="med" len="med"/>
+                    </a:lnB>
+                    <a:solidFill>
+                      <a:schemeClr val="bg1"/>
+                    </a:solidFill>
+                  </a:tcPr>
+                </a:tc>
+                <a:tc>
+                  <a:txBody>
+                    <a:bodyPr/>
+                    <a:lstStyle/>
+                    <a:p>
+                      <a:endParaRPr lang="en-US" dirty="0"/>
+                    </a:p>
+                  </a:txBody>
+                  <a:tcPr>
+                    <a:lnL w="12700" cap="flat" cmpd="sng" algn="ctr">
+                      <a:solidFill>
+                        <a:schemeClr val="tx1"/>
+                      </a:solidFill>
+                      <a:prstDash val="solid"/>
+                      <a:round/>
+                      <a:headEnd type="none" w="med" len="med"/>
+                      <a:tailEnd type="none" w="med" len="med"/>
+                    </a:lnL>
+                    <a:lnR w="12700" cap="flat" cmpd="sng" algn="ctr">
+                      <a:solidFill>
+                        <a:schemeClr val="tx1"/>
+                      </a:solidFill>
+                      <a:prstDash val="solid"/>
+                      <a:round/>
+                      <a:headEnd type="none" w="med" len="med"/>
+                      <a:tailEnd type="none" w="med" len="med"/>
+                    </a:lnR>
+                    <a:lnT w="12700" cap="flat" cmpd="sng" algn="ctr">
+                      <a:solidFill>
+                        <a:schemeClr val="tx1"/>
+                      </a:solidFill>
+                      <a:prstDash val="solid"/>
+                      <a:round/>
+                      <a:headEnd type="none" w="med" len="med"/>
+                      <a:tailEnd type="none" w="med" len="med"/>
+                    </a:lnT>
+                    <a:lnB w="12700" cap="flat" cmpd="sng" algn="ctr">
+                      <a:solidFill>
+                        <a:schemeClr val="tx1"/>
+                      </a:solidFill>
+                      <a:prstDash val="solid"/>
+                      <a:round/>
+                      <a:headEnd type="none" w="med" len="med"/>
+                      <a:tailEnd type="none" w="med" len="med"/>
+                    </a:lnB>
+                    <a:solidFill>
+                      <a:schemeClr val="bg1"/>
+                    </a:solidFill>
+                  </a:tcPr>
+                </a:tc>
+                <a:tc>
+                  <a:txBody>
+                    <a:bodyPr/>
+                    <a:lstStyle/>
+                    <a:p>
+                      <a:endParaRPr lang="en-US" dirty="0"/>
+                    </a:p>
+                  </a:txBody>
+                  <a:tcPr>
+                    <a:lnL w="12700" cap="flat" cmpd="sng" algn="ctr">
+                      <a:solidFill>
+                        <a:schemeClr val="tx1"/>
+                      </a:solidFill>
+                      <a:prstDash val="solid"/>
+                      <a:round/>
+                      <a:headEnd type="none" w="med" len="med"/>
+                      <a:tailEnd type="none" w="med" len="med"/>
+                    </a:lnL>
+                    <a:lnR w="12700" cap="flat" cmpd="sng" algn="ctr">
+                      <a:solidFill>
+                        <a:schemeClr val="tx1"/>
+                      </a:solidFill>
+                      <a:prstDash val="solid"/>
+                      <a:round/>
+                      <a:headEnd type="none" w="med" len="med"/>
+                      <a:tailEnd type="none" w="med" len="med"/>
+                    </a:lnR>
+                    <a:lnT w="12700" cap="flat" cmpd="sng" algn="ctr">
+                      <a:solidFill>
+                        <a:schemeClr val="tx1"/>
+                      </a:solidFill>
+                      <a:prstDash val="solid"/>
+                      <a:round/>
+                      <a:headEnd type="none" w="med" len="med"/>
+                      <a:tailEnd type="none" w="med" len="med"/>
+                    </a:lnT>
+                    <a:lnB w="12700" cap="flat" cmpd="sng" algn="ctr">
+                      <a:solidFill>
+                        <a:schemeClr val="tx1"/>
+                      </a:solidFill>
+                      <a:prstDash val="solid"/>
+                      <a:round/>
+                      <a:headEnd type="none" w="med" len="med"/>
+                      <a:tailEnd type="none" w="med" len="med"/>
+                    </a:lnB>
+                    <a:solidFill>
+                      <a:schemeClr val="bg1"/>
+                    </a:solidFill>
+                  </a:tcPr>
+                </a:tc>
+                <a:tc>
+                  <a:txBody>
+                    <a:bodyPr/>
+                    <a:lstStyle/>
+                    <a:p>
+                      <a:endParaRPr lang="en-US" dirty="0"/>
+                    </a:p>
+                  </a:txBody>
+                  <a:tcPr>
+                    <a:lnL w="12700" cap="flat" cmpd="sng" algn="ctr">
+                      <a:solidFill>
+                        <a:schemeClr val="tx1"/>
+                      </a:solidFill>
+                      <a:prstDash val="solid"/>
+                      <a:round/>
+                      <a:headEnd type="none" w="med" len="med"/>
+                      <a:tailEnd type="none" w="med" len="med"/>
+                    </a:lnL>
+                    <a:lnR w="12700" cap="flat" cmpd="sng" algn="ctr">
+                      <a:solidFill>
+                        <a:schemeClr val="tx1"/>
+                      </a:solidFill>
+                      <a:prstDash val="solid"/>
+                      <a:round/>
+                      <a:headEnd type="none" w="med" len="med"/>
+                      <a:tailEnd type="none" w="med" len="med"/>
+                    </a:lnR>
+                    <a:lnT w="12700" cap="flat" cmpd="sng" algn="ctr">
+                      <a:solidFill>
+                        <a:schemeClr val="tx1"/>
+                      </a:solidFill>
+                      <a:prstDash val="solid"/>
+                      <a:round/>
+                      <a:headEnd type="none" w="med" len="med"/>
+                      <a:tailEnd type="none" w="med" len="med"/>
+                    </a:lnT>
+                    <a:lnB w="12700" cap="flat" cmpd="sng" algn="ctr">
+                      <a:solidFill>
+                        <a:schemeClr val="tx1"/>
+                      </a:solidFill>
+                      <a:prstDash val="solid"/>
+                      <a:round/>
+                      <a:headEnd type="none" w="med" len="med"/>
+                      <a:tailEnd type="none" w="med" len="med"/>
+                    </a:lnB>
+                    <a:solidFill>
+                      <a:schemeClr val="bg1"/>
+                    </a:solidFill>
+                  </a:tcPr>
+                </a:tc>
+                <a:tc>
+                  <a:txBody>
+                    <a:bodyPr/>
+                    <a:lstStyle/>
+                    <a:p>
+                      <a:endParaRPr lang="en-US"/>
+                    </a:p>
+                  </a:txBody>
+                  <a:tcPr>
+                    <a:lnL w="12700" cap="flat" cmpd="sng" algn="ctr">
+                      <a:solidFill>
+                        <a:schemeClr val="tx1"/>
+                      </a:solidFill>
+                      <a:prstDash val="solid"/>
+                      <a:round/>
+                      <a:headEnd type="none" w="med" len="med"/>
+                      <a:tailEnd type="none" w="med" len="med"/>
+                    </a:lnL>
+                    <a:lnR w="12700" cap="flat" cmpd="sng" algn="ctr">
+                      <a:solidFill>
+                        <a:schemeClr val="tx1"/>
+                      </a:solidFill>
+                      <a:prstDash val="solid"/>
+                      <a:round/>
+                      <a:headEnd type="none" w="med" len="med"/>
+                      <a:tailEnd type="none" w="med" len="med"/>
+                    </a:lnR>
+                    <a:lnT w="12700" cap="flat" cmpd="sng" algn="ctr">
+                      <a:solidFill>
+                        <a:schemeClr val="tx1"/>
+                      </a:solidFill>
+                      <a:prstDash val="solid"/>
+                      <a:round/>
+                      <a:headEnd type="none" w="med" len="med"/>
+                      <a:tailEnd type="none" w="med" len="med"/>
+                    </a:lnT>
+                    <a:lnB w="12700" cap="flat" cmpd="sng" algn="ctr">
+                      <a:solidFill>
+                        <a:schemeClr val="tx1"/>
+                      </a:solidFill>
+                      <a:prstDash val="solid"/>
+                      <a:round/>
+                      <a:headEnd type="none" w="med" len="med"/>
+                      <a:tailEnd type="none" w="med" len="med"/>
+                    </a:lnB>
+                    <a:solidFill>
+                      <a:schemeClr val="bg1"/>
+                    </a:solidFill>
+                  </a:tcPr>
+                </a:tc>
+                <a:tc>
+                  <a:txBody>
+                    <a:bodyPr/>
+                    <a:lstStyle/>
+                    <a:p>
+                      <a:endParaRPr lang="en-US"/>
+                    </a:p>
+                  </a:txBody>
+                  <a:tcPr>
+                    <a:lnL w="12700" cap="flat" cmpd="sng" algn="ctr">
+                      <a:solidFill>
+                        <a:schemeClr val="tx1"/>
+                      </a:solidFill>
+                      <a:prstDash val="solid"/>
+                      <a:round/>
+                      <a:headEnd type="none" w="med" len="med"/>
+                      <a:tailEnd type="none" w="med" len="med"/>
+                    </a:lnL>
+                    <a:lnR w="12700" cap="flat" cmpd="sng" algn="ctr">
+                      <a:solidFill>
+                        <a:schemeClr val="tx1"/>
+                      </a:solidFill>
+                      <a:prstDash val="solid"/>
+                      <a:round/>
+                      <a:headEnd type="none" w="med" len="med"/>
+                      <a:tailEnd type="none" w="med" len="med"/>
+                    </a:lnR>
+                    <a:lnT w="12700" cap="flat" cmpd="sng" algn="ctr">
+                      <a:solidFill>
+                        <a:schemeClr val="tx1"/>
+                      </a:solidFill>
+                      <a:prstDash val="solid"/>
+                      <a:round/>
+                      <a:headEnd type="none" w="med" len="med"/>
+                      <a:tailEnd type="none" w="med" len="med"/>
+                    </a:lnT>
+                    <a:lnB w="12700" cap="flat" cmpd="sng" algn="ctr">
+                      <a:solidFill>
+                        <a:schemeClr val="tx1"/>
+                      </a:solidFill>
+                      <a:prstDash val="solid"/>
+                      <a:round/>
+                      <a:headEnd type="none" w="med" len="med"/>
+                      <a:tailEnd type="none" w="med" len="med"/>
+                    </a:lnB>
+                    <a:solidFill>
+                      <a:schemeClr val="bg1"/>
+                    </a:solidFill>
+                  </a:tcPr>
+                </a:tc>
+                <a:extLst>
+                  <a:ext uri="{0D108BD9-81ED-4DB2-BD59-A6C34878D82A}">
+                    <a16:rowId xmlns:a16="http://schemas.microsoft.com/office/drawing/2014/main" val="2342936059"/>
+                  </a:ext>
+                </a:extLst>
+              </a:tr>
+              <a:tr h="810587">
+                <a:tc>
+                  <a:txBody>
+                    <a:bodyPr/>
+                    <a:lstStyle/>
+                    <a:p>
+                      <a:endParaRPr lang="en-US"/>
+                    </a:p>
+                  </a:txBody>
+                  <a:tcPr>
+                    <a:lnL w="12700" cap="flat" cmpd="sng" algn="ctr">
+                      <a:solidFill>
+                        <a:schemeClr val="tx1"/>
+                      </a:solidFill>
+                      <a:prstDash val="solid"/>
+                      <a:round/>
+                      <a:headEnd type="none" w="med" len="med"/>
+                      <a:tailEnd type="none" w="med" len="med"/>
+                    </a:lnL>
+                    <a:lnR w="12700" cap="flat" cmpd="sng" algn="ctr">
+                      <a:solidFill>
+                        <a:schemeClr val="tx1"/>
+                      </a:solidFill>
+                      <a:prstDash val="solid"/>
+                      <a:round/>
+                      <a:headEnd type="none" w="med" len="med"/>
+                      <a:tailEnd type="none" w="med" len="med"/>
+                    </a:lnR>
+                    <a:lnT w="12700" cap="flat" cmpd="sng" algn="ctr">
+                      <a:solidFill>
+                        <a:schemeClr val="tx1"/>
+                      </a:solidFill>
+                      <a:prstDash val="solid"/>
+                      <a:round/>
+                      <a:headEnd type="none" w="med" len="med"/>
+                      <a:tailEnd type="none" w="med" len="med"/>
+                    </a:lnT>
+                    <a:lnB w="12700" cap="flat" cmpd="sng" algn="ctr">
+                      <a:solidFill>
+                        <a:schemeClr val="tx1"/>
+                      </a:solidFill>
+                      <a:prstDash val="solid"/>
+                      <a:round/>
+                      <a:headEnd type="none" w="med" len="med"/>
+                      <a:tailEnd type="none" w="med" len="med"/>
+                    </a:lnB>
+                    <a:solidFill>
+                      <a:schemeClr val="bg1"/>
+                    </a:solidFill>
+                  </a:tcPr>
+                </a:tc>
+                <a:tc>
+                  <a:txBody>
+                    <a:bodyPr/>
+                    <a:lstStyle/>
+                    <a:p>
+                      <a:endParaRPr lang="en-US"/>
+                    </a:p>
+                  </a:txBody>
+                  <a:tcPr>
+                    <a:lnL w="12700" cap="flat" cmpd="sng" algn="ctr">
+                      <a:solidFill>
+                        <a:schemeClr val="tx1"/>
+                      </a:solidFill>
+                      <a:prstDash val="solid"/>
+                      <a:round/>
+                      <a:headEnd type="none" w="med" len="med"/>
+                      <a:tailEnd type="none" w="med" len="med"/>
+                    </a:lnL>
+                    <a:lnR w="12700" cap="flat" cmpd="sng" algn="ctr">
+                      <a:solidFill>
+                        <a:schemeClr val="tx1"/>
+                      </a:solidFill>
+                      <a:prstDash val="solid"/>
+                      <a:round/>
+                      <a:headEnd type="none" w="med" len="med"/>
+                      <a:tailEnd type="none" w="med" len="med"/>
+                    </a:lnR>
+                    <a:lnT w="12700" cap="flat" cmpd="sng" algn="ctr">
+                      <a:solidFill>
+                        <a:schemeClr val="tx1"/>
+                      </a:solidFill>
+                      <a:prstDash val="solid"/>
+                      <a:round/>
+                      <a:headEnd type="none" w="med" len="med"/>
+                      <a:tailEnd type="none" w="med" len="med"/>
+                    </a:lnT>
+                    <a:lnB w="12700" cap="flat" cmpd="sng" algn="ctr">
+                      <a:solidFill>
+                        <a:schemeClr val="tx1"/>
+                      </a:solidFill>
+                      <a:prstDash val="solid"/>
+                      <a:round/>
+                      <a:headEnd type="none" w="med" len="med"/>
+                      <a:tailEnd type="none" w="med" len="med"/>
+                    </a:lnB>
+                    <a:solidFill>
+                      <a:schemeClr val="bg1"/>
+                    </a:solidFill>
+                  </a:tcPr>
+                </a:tc>
+                <a:tc>
+                  <a:txBody>
+                    <a:bodyPr/>
+                    <a:lstStyle/>
+                    <a:p>
+                      <a:endParaRPr lang="en-US" dirty="0"/>
+                    </a:p>
+                  </a:txBody>
+                  <a:tcPr>
+                    <a:lnL w="12700" cap="flat" cmpd="sng" algn="ctr">
+                      <a:solidFill>
+                        <a:schemeClr val="tx1"/>
+                      </a:solidFill>
+                      <a:prstDash val="solid"/>
+                      <a:round/>
+                      <a:headEnd type="none" w="med" len="med"/>
+                      <a:tailEnd type="none" w="med" len="med"/>
+                    </a:lnL>
+                    <a:lnR w="12700" cap="flat" cmpd="sng" algn="ctr">
+                      <a:solidFill>
+                        <a:schemeClr val="tx1"/>
+                      </a:solidFill>
+                      <a:prstDash val="solid"/>
+                      <a:round/>
+                      <a:headEnd type="none" w="med" len="med"/>
+                      <a:tailEnd type="none" w="med" len="med"/>
+                    </a:lnR>
+                    <a:lnT w="12700" cap="flat" cmpd="sng" algn="ctr">
+                      <a:solidFill>
+                        <a:schemeClr val="tx1"/>
+                      </a:solidFill>
+                      <a:prstDash val="solid"/>
+                      <a:round/>
+                      <a:headEnd type="none" w="med" len="med"/>
+                      <a:tailEnd type="none" w="med" len="med"/>
+                    </a:lnT>
+                    <a:lnB w="12700" cap="flat" cmpd="sng" algn="ctr">
+                      <a:solidFill>
+                        <a:schemeClr val="tx1"/>
+                      </a:solidFill>
+                      <a:prstDash val="solid"/>
+                      <a:round/>
+                      <a:headEnd type="none" w="med" len="med"/>
+                      <a:tailEnd type="none" w="med" len="med"/>
+                    </a:lnB>
+                    <a:solidFill>
+                      <a:schemeClr val="bg1"/>
+                    </a:solidFill>
+                  </a:tcPr>
+                </a:tc>
+                <a:tc>
+                  <a:txBody>
+                    <a:bodyPr/>
+                    <a:lstStyle/>
+                    <a:p>
+                      <a:endParaRPr lang="en-US"/>
+                    </a:p>
+                  </a:txBody>
+                  <a:tcPr>
+                    <a:lnL w="12700" cap="flat" cmpd="sng" algn="ctr">
+                      <a:solidFill>
+                        <a:schemeClr val="tx1"/>
+                      </a:solidFill>
+                      <a:prstDash val="solid"/>
+                      <a:round/>
+                      <a:headEnd type="none" w="med" len="med"/>
+                      <a:tailEnd type="none" w="med" len="med"/>
+                    </a:lnL>
+                    <a:lnR w="12700" cap="flat" cmpd="sng" algn="ctr">
+                      <a:solidFill>
+                        <a:schemeClr val="tx1"/>
+                      </a:solidFill>
+                      <a:prstDash val="solid"/>
+                      <a:round/>
+                      <a:headEnd type="none" w="med" len="med"/>
+                      <a:tailEnd type="none" w="med" len="med"/>
+                    </a:lnR>
+                    <a:lnT w="12700" cap="flat" cmpd="sng" algn="ctr">
+                      <a:solidFill>
+                        <a:schemeClr val="tx1"/>
+                      </a:solidFill>
+                      <a:prstDash val="solid"/>
+                      <a:round/>
+                      <a:headEnd type="none" w="med" len="med"/>
+                      <a:tailEnd type="none" w="med" len="med"/>
+                    </a:lnT>
+                    <a:lnB w="12700" cap="flat" cmpd="sng" algn="ctr">
+                      <a:solidFill>
+                        <a:schemeClr val="tx1"/>
+                      </a:solidFill>
+                      <a:prstDash val="solid"/>
+                      <a:round/>
+                      <a:headEnd type="none" w="med" len="med"/>
+                      <a:tailEnd type="none" w="med" len="med"/>
+                    </a:lnB>
+                    <a:solidFill>
+                      <a:schemeClr val="bg1"/>
+                    </a:solidFill>
+                  </a:tcPr>
+                </a:tc>
+                <a:tc>
+                  <a:txBody>
+                    <a:bodyPr/>
+                    <a:lstStyle/>
+                    <a:p>
+                      <a:endParaRPr lang="en-US" dirty="0"/>
+                    </a:p>
+                  </a:txBody>
+                  <a:tcPr>
+                    <a:lnL w="12700" cap="flat" cmpd="sng" algn="ctr">
+                      <a:solidFill>
+                        <a:schemeClr val="tx1"/>
+                      </a:solidFill>
+                      <a:prstDash val="solid"/>
+                      <a:round/>
+                      <a:headEnd type="none" w="med" len="med"/>
+                      <a:tailEnd type="none" w="med" len="med"/>
+                    </a:lnL>
+                    <a:lnR w="12700" cap="flat" cmpd="sng" algn="ctr">
+                      <a:solidFill>
+                        <a:schemeClr val="tx1"/>
+                      </a:solidFill>
+                      <a:prstDash val="solid"/>
+                      <a:round/>
+                      <a:headEnd type="none" w="med" len="med"/>
+                      <a:tailEnd type="none" w="med" len="med"/>
+                    </a:lnR>
+                    <a:lnT w="12700" cap="flat" cmpd="sng" algn="ctr">
+                      <a:solidFill>
+                        <a:schemeClr val="tx1"/>
+                      </a:solidFill>
+                      <a:prstDash val="solid"/>
+                      <a:round/>
+                      <a:headEnd type="none" w="med" len="med"/>
+                      <a:tailEnd type="none" w="med" len="med"/>
+                    </a:lnT>
+                    <a:lnB w="12700" cap="flat" cmpd="sng" algn="ctr">
+                      <a:solidFill>
+                        <a:schemeClr val="tx1"/>
+                      </a:solidFill>
+                      <a:prstDash val="solid"/>
+                      <a:round/>
+                      <a:headEnd type="none" w="med" len="med"/>
+                      <a:tailEnd type="none" w="med" len="med"/>
+                    </a:lnB>
+                    <a:solidFill>
+                      <a:schemeClr val="bg1"/>
+                    </a:solidFill>
+                  </a:tcPr>
+                </a:tc>
+                <a:tc>
+                  <a:txBody>
+                    <a:bodyPr/>
+                    <a:lstStyle/>
+                    <a:p>
+                      <a:endParaRPr lang="en-US"/>
+                    </a:p>
+                  </a:txBody>
+                  <a:tcPr>
+                    <a:lnL w="12700" cap="flat" cmpd="sng" algn="ctr">
+                      <a:solidFill>
+                        <a:schemeClr val="tx1"/>
+                      </a:solidFill>
+                      <a:prstDash val="solid"/>
+                      <a:round/>
+                      <a:headEnd type="none" w="med" len="med"/>
+                      <a:tailEnd type="none" w="med" len="med"/>
+                    </a:lnL>
+                    <a:lnR w="12700" cap="flat" cmpd="sng" algn="ctr">
+                      <a:solidFill>
+                        <a:schemeClr val="tx1"/>
+                      </a:solidFill>
+                      <a:prstDash val="solid"/>
+                      <a:round/>
+                      <a:headEnd type="none" w="med" len="med"/>
+                      <a:tailEnd type="none" w="med" len="med"/>
+                    </a:lnR>
+                    <a:lnT w="12700" cap="flat" cmpd="sng" algn="ctr">
+                      <a:solidFill>
+                        <a:schemeClr val="tx1"/>
+                      </a:solidFill>
+                      <a:prstDash val="solid"/>
+                      <a:round/>
+                      <a:headEnd type="none" w="med" len="med"/>
+                      <a:tailEnd type="none" w="med" len="med"/>
+                    </a:lnT>
+                    <a:lnB w="12700" cap="flat" cmpd="sng" algn="ctr">
+                      <a:solidFill>
+                        <a:schemeClr val="tx1"/>
+                      </a:solidFill>
+                      <a:prstDash val="solid"/>
+                      <a:round/>
+                      <a:headEnd type="none" w="med" len="med"/>
+                      <a:tailEnd type="none" w="med" len="med"/>
+                    </a:lnB>
+                    <a:solidFill>
+                      <a:schemeClr val="bg1"/>
+                    </a:solidFill>
+                  </a:tcPr>
+                </a:tc>
+                <a:tc>
+                  <a:txBody>
+                    <a:bodyPr/>
+                    <a:lstStyle/>
+                    <a:p>
+                      <a:endParaRPr lang="en-US"/>
+                    </a:p>
+                  </a:txBody>
+                  <a:tcPr>
+                    <a:lnL w="12700" cap="flat" cmpd="sng" algn="ctr">
+                      <a:solidFill>
+                        <a:schemeClr val="tx1"/>
+                      </a:solidFill>
+                      <a:prstDash val="solid"/>
+                      <a:round/>
+                      <a:headEnd type="none" w="med" len="med"/>
+                      <a:tailEnd type="none" w="med" len="med"/>
+                    </a:lnL>
+                    <a:lnR w="12700" cap="flat" cmpd="sng" algn="ctr">
+                      <a:solidFill>
+                        <a:schemeClr val="tx1"/>
+                      </a:solidFill>
+                      <a:prstDash val="solid"/>
+                      <a:round/>
+                      <a:headEnd type="none" w="med" len="med"/>
+                      <a:tailEnd type="none" w="med" len="med"/>
+                    </a:lnR>
+                    <a:lnT w="12700" cap="flat" cmpd="sng" algn="ctr">
+                      <a:solidFill>
+                        <a:schemeClr val="tx1"/>
+                      </a:solidFill>
+                      <a:prstDash val="solid"/>
+                      <a:round/>
+                      <a:headEnd type="none" w="med" len="med"/>
+                      <a:tailEnd type="none" w="med" len="med"/>
+                    </a:lnT>
+                    <a:lnB w="12700" cap="flat" cmpd="sng" algn="ctr">
+                      <a:solidFill>
+                        <a:schemeClr val="tx1"/>
+                      </a:solidFill>
+                      <a:prstDash val="solid"/>
+                      <a:round/>
+                      <a:headEnd type="none" w="med" len="med"/>
+                      <a:tailEnd type="none" w="med" len="med"/>
+                    </a:lnB>
+                    <a:solidFill>
+                      <a:schemeClr val="bg1"/>
+                    </a:solidFill>
+                  </a:tcPr>
+                </a:tc>
+                <a:tc>
+                  <a:txBody>
+                    <a:bodyPr/>
+                    <a:lstStyle/>
+                    <a:p>
+                      <a:endParaRPr lang="en-US" dirty="0"/>
+                    </a:p>
+                  </a:txBody>
+                  <a:tcPr>
+                    <a:lnL w="12700" cap="flat" cmpd="sng" algn="ctr">
+                      <a:solidFill>
+                        <a:schemeClr val="tx1"/>
+                      </a:solidFill>
+                      <a:prstDash val="solid"/>
+                      <a:round/>
+                      <a:headEnd type="none" w="med" len="med"/>
+                      <a:tailEnd type="none" w="med" len="med"/>
+                    </a:lnL>
+                    <a:lnR w="12700" cap="flat" cmpd="sng" algn="ctr">
+                      <a:solidFill>
+                        <a:schemeClr val="tx1"/>
+                      </a:solidFill>
+                      <a:prstDash val="solid"/>
+                      <a:round/>
+                      <a:headEnd type="none" w="med" len="med"/>
+                      <a:tailEnd type="none" w="med" len="med"/>
+                    </a:lnR>
+                    <a:lnT w="12700" cap="flat" cmpd="sng" algn="ctr">
+                      <a:solidFill>
+                        <a:schemeClr val="tx1"/>
+                      </a:solidFill>
+                      <a:prstDash val="solid"/>
+                      <a:round/>
+                      <a:headEnd type="none" w="med" len="med"/>
+                      <a:tailEnd type="none" w="med" len="med"/>
+                    </a:lnT>
+                    <a:lnB w="12700" cap="flat" cmpd="sng" algn="ctr">
+                      <a:solidFill>
+                        <a:schemeClr val="tx1"/>
+                      </a:solidFill>
+                      <a:prstDash val="solid"/>
+                      <a:round/>
+                      <a:headEnd type="none" w="med" len="med"/>
+                      <a:tailEnd type="none" w="med" len="med"/>
+                    </a:lnB>
+                    <a:solidFill>
+                      <a:schemeClr val="bg1"/>
+                    </a:solidFill>
+                  </a:tcPr>
+                </a:tc>
+                <a:extLst>
+                  <a:ext uri="{0D108BD9-81ED-4DB2-BD59-A6C34878D82A}">
+                    <a16:rowId xmlns:a16="http://schemas.microsoft.com/office/drawing/2014/main" val="1599043124"/>
+                  </a:ext>
+                </a:extLst>
+              </a:tr>
+              <a:tr h="810587">
+                <a:tc>
+                  <a:txBody>
+                    <a:bodyPr/>
+                    <a:lstStyle/>
+                    <a:p>
+                      <a:endParaRPr lang="en-US"/>
+                    </a:p>
+                  </a:txBody>
+                  <a:tcPr>
+                    <a:lnL w="12700" cap="flat" cmpd="sng" algn="ctr">
+                      <a:solidFill>
+                        <a:schemeClr val="tx1"/>
+                      </a:solidFill>
+                      <a:prstDash val="solid"/>
+                      <a:round/>
+                      <a:headEnd type="none" w="med" len="med"/>
+                      <a:tailEnd type="none" w="med" len="med"/>
+                    </a:lnL>
+                    <a:lnR w="12700" cap="flat" cmpd="sng" algn="ctr">
+                      <a:solidFill>
+                        <a:schemeClr val="tx1"/>
+                      </a:solidFill>
+                      <a:prstDash val="solid"/>
+                      <a:round/>
+                      <a:headEnd type="none" w="med" len="med"/>
+                      <a:tailEnd type="none" w="med" len="med"/>
+                    </a:lnR>
+                    <a:lnT w="12700" cap="flat" cmpd="sng" algn="ctr">
+                      <a:solidFill>
+                        <a:schemeClr val="tx1"/>
+                      </a:solidFill>
+                      <a:prstDash val="solid"/>
+                      <a:round/>
+                      <a:headEnd type="none" w="med" len="med"/>
+                      <a:tailEnd type="none" w="med" len="med"/>
+                    </a:lnT>
+                    <a:lnB w="12700" cap="flat" cmpd="sng" algn="ctr">
+                      <a:solidFill>
+                        <a:schemeClr val="tx1"/>
+                      </a:solidFill>
+                      <a:prstDash val="solid"/>
+                      <a:round/>
+                      <a:headEnd type="none" w="med" len="med"/>
+                      <a:tailEnd type="none" w="med" len="med"/>
+                    </a:lnB>
+                    <a:solidFill>
+                      <a:schemeClr val="bg1"/>
+                    </a:solidFill>
+                  </a:tcPr>
+                </a:tc>
+                <a:tc>
+                  <a:txBody>
+                    <a:bodyPr/>
+                    <a:lstStyle/>
+                    <a:p>
+                      <a:endParaRPr lang="en-US" dirty="0"/>
+                    </a:p>
+                  </a:txBody>
+                  <a:tcPr>
+                    <a:lnL w="12700" cap="flat" cmpd="sng" algn="ctr">
+                      <a:solidFill>
+                        <a:schemeClr val="tx1"/>
+                      </a:solidFill>
+                      <a:prstDash val="solid"/>
+                      <a:round/>
+                      <a:headEnd type="none" w="med" len="med"/>
+                      <a:tailEnd type="none" w="med" len="med"/>
+                    </a:lnL>
+                    <a:lnR w="12700" cap="flat" cmpd="sng" algn="ctr">
+                      <a:solidFill>
+                        <a:schemeClr val="tx1"/>
+                      </a:solidFill>
+                      <a:prstDash val="solid"/>
+                      <a:round/>
+                      <a:headEnd type="none" w="med" len="med"/>
+                      <a:tailEnd type="none" w="med" len="med"/>
+                    </a:lnR>
+                    <a:lnT w="12700" cap="flat" cmpd="sng" algn="ctr">
+                      <a:solidFill>
+                        <a:schemeClr val="tx1"/>
+                      </a:solidFill>
+                      <a:prstDash val="solid"/>
+                      <a:round/>
+                      <a:headEnd type="none" w="med" len="med"/>
+                      <a:tailEnd type="none" w="med" len="med"/>
+                    </a:lnT>
+                    <a:lnB w="12700" cap="flat" cmpd="sng" algn="ctr">
+                      <a:solidFill>
+                        <a:schemeClr val="tx1"/>
+                      </a:solidFill>
+                      <a:prstDash val="solid"/>
+                      <a:round/>
+                      <a:headEnd type="none" w="med" len="med"/>
+                      <a:tailEnd type="none" w="med" len="med"/>
+                    </a:lnB>
+                    <a:solidFill>
+                      <a:schemeClr val="bg1"/>
+                    </a:solidFill>
+                  </a:tcPr>
+                </a:tc>
+                <a:tc>
+                  <a:txBody>
+                    <a:bodyPr/>
+                    <a:lstStyle/>
+                    <a:p>
+                      <a:endParaRPr lang="en-US"/>
+                    </a:p>
+                  </a:txBody>
+                  <a:tcPr>
+                    <a:lnL w="12700" cap="flat" cmpd="sng" algn="ctr">
+                      <a:solidFill>
+                        <a:schemeClr val="tx1"/>
+                      </a:solidFill>
+                      <a:prstDash val="solid"/>
+                      <a:round/>
+                      <a:headEnd type="none" w="med" len="med"/>
+                      <a:tailEnd type="none" w="med" len="med"/>
+                    </a:lnL>
+                    <a:lnR w="12700" cap="flat" cmpd="sng" algn="ctr">
+                      <a:solidFill>
+                        <a:schemeClr val="tx1"/>
+                      </a:solidFill>
+                      <a:prstDash val="solid"/>
+                      <a:round/>
+                      <a:headEnd type="none" w="med" len="med"/>
+                      <a:tailEnd type="none" w="med" len="med"/>
+                    </a:lnR>
+                    <a:lnT w="12700" cap="flat" cmpd="sng" algn="ctr">
+                      <a:solidFill>
+                        <a:schemeClr val="tx1"/>
+                      </a:solidFill>
+                      <a:prstDash val="solid"/>
+                      <a:round/>
+                      <a:headEnd type="none" w="med" len="med"/>
+                      <a:tailEnd type="none" w="med" len="med"/>
+                    </a:lnT>
+                    <a:lnB w="12700" cap="flat" cmpd="sng" algn="ctr">
+                      <a:solidFill>
+                        <a:schemeClr val="tx1"/>
+                      </a:solidFill>
+                      <a:prstDash val="solid"/>
+                      <a:round/>
+                      <a:headEnd type="none" w="med" len="med"/>
+                      <a:tailEnd type="none" w="med" len="med"/>
+                    </a:lnB>
+                    <a:solidFill>
+                      <a:schemeClr val="bg1"/>
+                    </a:solidFill>
+                  </a:tcPr>
+                </a:tc>
+                <a:tc>
+                  <a:txBody>
+                    <a:bodyPr/>
+                    <a:lstStyle/>
+                    <a:p>
+                      <a:endParaRPr lang="en-US"/>
+                    </a:p>
+                  </a:txBody>
+                  <a:tcPr>
+                    <a:lnL w="12700" cap="flat" cmpd="sng" algn="ctr">
+                      <a:solidFill>
+                        <a:schemeClr val="tx1"/>
+                      </a:solidFill>
+                      <a:prstDash val="solid"/>
+                      <a:round/>
+                      <a:headEnd type="none" w="med" len="med"/>
+                      <a:tailEnd type="none" w="med" len="med"/>
+                    </a:lnL>
+                    <a:lnR w="12700" cap="flat" cmpd="sng" algn="ctr">
+                      <a:solidFill>
+                        <a:schemeClr val="tx1"/>
+                      </a:solidFill>
+                      <a:prstDash val="solid"/>
+                      <a:round/>
+                      <a:headEnd type="none" w="med" len="med"/>
+                      <a:tailEnd type="none" w="med" len="med"/>
+                    </a:lnR>
+                    <a:lnT w="12700" cap="flat" cmpd="sng" algn="ctr">
+                      <a:solidFill>
+                        <a:schemeClr val="tx1"/>
+                      </a:solidFill>
+                      <a:prstDash val="solid"/>
+                      <a:round/>
+                      <a:headEnd type="none" w="med" len="med"/>
+                      <a:tailEnd type="none" w="med" len="med"/>
+                    </a:lnT>
+                    <a:lnB w="12700" cap="flat" cmpd="sng" algn="ctr">
+                      <a:solidFill>
+                        <a:schemeClr val="tx1"/>
+                      </a:solidFill>
+                      <a:prstDash val="solid"/>
+                      <a:round/>
+                      <a:headEnd type="none" w="med" len="med"/>
+                      <a:tailEnd type="none" w="med" len="med"/>
+                    </a:lnB>
+                    <a:solidFill>
+                      <a:schemeClr val="bg1"/>
+                    </a:solidFill>
+                  </a:tcPr>
+                </a:tc>
+                <a:tc>
+                  <a:txBody>
+                    <a:bodyPr/>
+                    <a:lstStyle/>
+                    <a:p>
+                      <a:endParaRPr lang="en-US" dirty="0"/>
+                    </a:p>
+                  </a:txBody>
+                  <a:tcPr>
+                    <a:lnL w="12700" cap="flat" cmpd="sng" algn="ctr">
+                      <a:solidFill>
+                        <a:schemeClr val="tx1"/>
+                      </a:solidFill>
+                      <a:prstDash val="solid"/>
+                      <a:round/>
+                      <a:headEnd type="none" w="med" len="med"/>
+                      <a:tailEnd type="none" w="med" len="med"/>
+                    </a:lnL>
+                    <a:lnR w="12700" cap="flat" cmpd="sng" algn="ctr">
+                      <a:solidFill>
+                        <a:schemeClr val="tx1"/>
+                      </a:solidFill>
+                      <a:prstDash val="solid"/>
+                      <a:round/>
+                      <a:headEnd type="none" w="med" len="med"/>
+                      <a:tailEnd type="none" w="med" len="med"/>
+                    </a:lnR>
+                    <a:lnT w="12700" cap="flat" cmpd="sng" algn="ctr">
+                      <a:solidFill>
+                        <a:schemeClr val="tx1"/>
+                      </a:solidFill>
+                      <a:prstDash val="solid"/>
+                      <a:round/>
+                      <a:headEnd type="none" w="med" len="med"/>
+                      <a:tailEnd type="none" w="med" len="med"/>
+                    </a:lnT>
+                    <a:lnB w="12700" cap="flat" cmpd="sng" algn="ctr">
+                      <a:solidFill>
+                        <a:schemeClr val="tx1"/>
+                      </a:solidFill>
+                      <a:prstDash val="solid"/>
+                      <a:round/>
+                      <a:headEnd type="none" w="med" len="med"/>
+                      <a:tailEnd type="none" w="med" len="med"/>
+                    </a:lnB>
+                    <a:solidFill>
+                      <a:schemeClr val="bg1"/>
+                    </a:solidFill>
+                  </a:tcPr>
+                </a:tc>
+                <a:tc>
+                  <a:txBody>
+                    <a:bodyPr/>
+                    <a:lstStyle/>
+                    <a:p>
+                      <a:endParaRPr lang="en-US" dirty="0"/>
+                    </a:p>
+                  </a:txBody>
+                  <a:tcPr>
+                    <a:lnL w="12700" cap="flat" cmpd="sng" algn="ctr">
+                      <a:solidFill>
+                        <a:schemeClr val="tx1"/>
+                      </a:solidFill>
+                      <a:prstDash val="solid"/>
+                      <a:round/>
+                      <a:headEnd type="none" w="med" len="med"/>
+                      <a:tailEnd type="none" w="med" len="med"/>
+                    </a:lnL>
+                    <a:lnR w="12700" cap="flat" cmpd="sng" algn="ctr">
+                      <a:solidFill>
+                        <a:schemeClr val="tx1"/>
+                      </a:solidFill>
+                      <a:prstDash val="solid"/>
+                      <a:round/>
+                      <a:headEnd type="none" w="med" len="med"/>
+                      <a:tailEnd type="none" w="med" len="med"/>
+                    </a:lnR>
+                    <a:lnT w="12700" cap="flat" cmpd="sng" algn="ctr">
+                      <a:solidFill>
+                        <a:schemeClr val="tx1"/>
+                      </a:solidFill>
+                      <a:prstDash val="solid"/>
+                      <a:round/>
+                      <a:headEnd type="none" w="med" len="med"/>
+                      <a:tailEnd type="none" w="med" len="med"/>
+                    </a:lnT>
+                    <a:lnB w="12700" cap="flat" cmpd="sng" algn="ctr">
+                      <a:solidFill>
+                        <a:schemeClr val="tx1"/>
+                      </a:solidFill>
+                      <a:prstDash val="solid"/>
+                      <a:round/>
+                      <a:headEnd type="none" w="med" len="med"/>
+                      <a:tailEnd type="none" w="med" len="med"/>
+                    </a:lnB>
+                    <a:solidFill>
+                      <a:schemeClr val="bg1"/>
+                    </a:solidFill>
+                  </a:tcPr>
+                </a:tc>
+                <a:tc>
+                  <a:txBody>
+                    <a:bodyPr/>
+                    <a:lstStyle/>
+                    <a:p>
+                      <a:endParaRPr lang="en-US" dirty="0"/>
+                    </a:p>
+                  </a:txBody>
+                  <a:tcPr>
+                    <a:lnL w="12700" cap="flat" cmpd="sng" algn="ctr">
+                      <a:solidFill>
+                        <a:schemeClr val="tx1"/>
+                      </a:solidFill>
+                      <a:prstDash val="solid"/>
+                      <a:round/>
+                      <a:headEnd type="none" w="med" len="med"/>
+                      <a:tailEnd type="none" w="med" len="med"/>
+                    </a:lnL>
+                    <a:lnR w="12700" cap="flat" cmpd="sng" algn="ctr">
+                      <a:solidFill>
+                        <a:schemeClr val="tx1"/>
+                      </a:solidFill>
+                      <a:prstDash val="solid"/>
+                      <a:round/>
+                      <a:headEnd type="none" w="med" len="med"/>
+                      <a:tailEnd type="none" w="med" len="med"/>
+                    </a:lnR>
+                    <a:lnT w="12700" cap="flat" cmpd="sng" algn="ctr">
+                      <a:solidFill>
+                        <a:schemeClr val="tx1"/>
+                      </a:solidFill>
+                      <a:prstDash val="solid"/>
+                      <a:round/>
+                      <a:headEnd type="none" w="med" len="med"/>
+                      <a:tailEnd type="none" w="med" len="med"/>
+                    </a:lnT>
+                    <a:lnB w="12700" cap="flat" cmpd="sng" algn="ctr">
+                      <a:solidFill>
+                        <a:schemeClr val="tx1"/>
+                      </a:solidFill>
+                      <a:prstDash val="solid"/>
+                      <a:round/>
+                      <a:headEnd type="none" w="med" len="med"/>
+                      <a:tailEnd type="none" w="med" len="med"/>
+                    </a:lnB>
+                    <a:solidFill>
+                      <a:schemeClr val="bg1"/>
+                    </a:solidFill>
+                  </a:tcPr>
+                </a:tc>
+                <a:tc>
+                  <a:txBody>
+                    <a:bodyPr/>
+                    <a:lstStyle/>
+                    <a:p>
+                      <a:endParaRPr lang="en-US"/>
+                    </a:p>
+                  </a:txBody>
+                  <a:tcPr>
+                    <a:lnL w="12700" cap="flat" cmpd="sng" algn="ctr">
+                      <a:solidFill>
+                        <a:schemeClr val="tx1"/>
+                      </a:solidFill>
+                      <a:prstDash val="solid"/>
+                      <a:round/>
+                      <a:headEnd type="none" w="med" len="med"/>
+                      <a:tailEnd type="none" w="med" len="med"/>
+                    </a:lnL>
+                    <a:lnR w="12700" cap="flat" cmpd="sng" algn="ctr">
+                      <a:solidFill>
+                        <a:schemeClr val="tx1"/>
+                      </a:solidFill>
+                      <a:prstDash val="solid"/>
+                      <a:round/>
+                      <a:headEnd type="none" w="med" len="med"/>
+                      <a:tailEnd type="none" w="med" len="med"/>
+                    </a:lnR>
+                    <a:lnT w="12700" cap="flat" cmpd="sng" algn="ctr">
+                      <a:solidFill>
+                        <a:schemeClr val="tx1"/>
+                      </a:solidFill>
+                      <a:prstDash val="solid"/>
+                      <a:round/>
+                      <a:headEnd type="none" w="med" len="med"/>
+                      <a:tailEnd type="none" w="med" len="med"/>
+                    </a:lnT>
+                    <a:lnB w="12700" cap="flat" cmpd="sng" algn="ctr">
+                      <a:solidFill>
+                        <a:schemeClr val="tx1"/>
+                      </a:solidFill>
+                      <a:prstDash val="solid"/>
+                      <a:round/>
+                      <a:headEnd type="none" w="med" len="med"/>
+                      <a:tailEnd type="none" w="med" len="med"/>
+                    </a:lnB>
+                    <a:solidFill>
+                      <a:schemeClr val="bg1"/>
+                    </a:solidFill>
+                  </a:tcPr>
+                </a:tc>
+                <a:extLst>
+                  <a:ext uri="{0D108BD9-81ED-4DB2-BD59-A6C34878D82A}">
+                    <a16:rowId xmlns:a16="http://schemas.microsoft.com/office/drawing/2014/main" val="2984290815"/>
+                  </a:ext>
+                </a:extLst>
+              </a:tr>
+              <a:tr h="810587">
+                <a:tc>
+                  <a:txBody>
+                    <a:bodyPr/>
+                    <a:lstStyle/>
+                    <a:p>
+                      <a:endParaRPr lang="en-US" dirty="0"/>
+                    </a:p>
+                  </a:txBody>
+                  <a:tcPr>
+                    <a:lnL w="12700" cap="flat" cmpd="sng" algn="ctr">
+                      <a:solidFill>
+                        <a:schemeClr val="tx1"/>
+                      </a:solidFill>
+                      <a:prstDash val="solid"/>
+                      <a:round/>
+                      <a:headEnd type="none" w="med" len="med"/>
+                      <a:tailEnd type="none" w="med" len="med"/>
+                    </a:lnL>
+                    <a:lnR w="12700" cap="flat" cmpd="sng" algn="ctr">
+                      <a:solidFill>
+                        <a:schemeClr val="tx1"/>
+                      </a:solidFill>
+                      <a:prstDash val="solid"/>
+                      <a:round/>
+                      <a:headEnd type="none" w="med" len="med"/>
+                      <a:tailEnd type="none" w="med" len="med"/>
+                    </a:lnR>
+                    <a:lnT w="12700" cap="flat" cmpd="sng" algn="ctr">
+                      <a:solidFill>
+                        <a:schemeClr val="tx1"/>
+                      </a:solidFill>
+                      <a:prstDash val="solid"/>
+                      <a:round/>
+                      <a:headEnd type="none" w="med" len="med"/>
+                      <a:tailEnd type="none" w="med" len="med"/>
+                    </a:lnT>
+                    <a:lnB w="12700" cap="flat" cmpd="sng" algn="ctr">
+                      <a:solidFill>
+                        <a:schemeClr val="tx1"/>
+                      </a:solidFill>
+                      <a:prstDash val="solid"/>
+                      <a:round/>
+                      <a:headEnd type="none" w="med" len="med"/>
+                      <a:tailEnd type="none" w="med" len="med"/>
+                    </a:lnB>
+                    <a:solidFill>
+                      <a:schemeClr val="bg1"/>
+                    </a:solidFill>
+                  </a:tcPr>
+                </a:tc>
+                <a:tc>
+                  <a:txBody>
+                    <a:bodyPr/>
+                    <a:lstStyle/>
+                    <a:p>
+                      <a:endParaRPr lang="en-US"/>
+                    </a:p>
+                  </a:txBody>
+                  <a:tcPr>
+                    <a:lnL w="12700" cap="flat" cmpd="sng" algn="ctr">
+                      <a:solidFill>
+                        <a:schemeClr val="tx1"/>
+                      </a:solidFill>
+                      <a:prstDash val="solid"/>
+                      <a:round/>
+                      <a:headEnd type="none" w="med" len="med"/>
+                      <a:tailEnd type="none" w="med" len="med"/>
+                    </a:lnL>
+                    <a:lnR w="12700" cap="flat" cmpd="sng" algn="ctr">
+                      <a:solidFill>
+                        <a:schemeClr val="tx1"/>
+                      </a:solidFill>
+                      <a:prstDash val="solid"/>
+                      <a:round/>
+                      <a:headEnd type="none" w="med" len="med"/>
+                      <a:tailEnd type="none" w="med" len="med"/>
+                    </a:lnR>
+                    <a:lnT w="12700" cap="flat" cmpd="sng" algn="ctr">
+                      <a:solidFill>
+                        <a:schemeClr val="tx1"/>
+                      </a:solidFill>
+                      <a:prstDash val="solid"/>
+                      <a:round/>
+                      <a:headEnd type="none" w="med" len="med"/>
+                      <a:tailEnd type="none" w="med" len="med"/>
+                    </a:lnT>
+                    <a:lnB w="12700" cap="flat" cmpd="sng" algn="ctr">
+                      <a:solidFill>
+                        <a:schemeClr val="tx1"/>
+                      </a:solidFill>
+                      <a:prstDash val="solid"/>
+                      <a:round/>
+                      <a:headEnd type="none" w="med" len="med"/>
+                      <a:tailEnd type="none" w="med" len="med"/>
+                    </a:lnB>
+                    <a:solidFill>
+                      <a:schemeClr val="bg1"/>
+                    </a:solidFill>
+                  </a:tcPr>
+                </a:tc>
+                <a:tc>
+                  <a:txBody>
+                    <a:bodyPr/>
+                    <a:lstStyle/>
+                    <a:p>
+                      <a:endParaRPr lang="en-US"/>
+                    </a:p>
+                  </a:txBody>
+                  <a:tcPr>
+                    <a:lnL w="12700" cap="flat" cmpd="sng" algn="ctr">
+                      <a:solidFill>
+                        <a:schemeClr val="tx1"/>
+                      </a:solidFill>
+                      <a:prstDash val="solid"/>
+                      <a:round/>
+                      <a:headEnd type="none" w="med" len="med"/>
+                      <a:tailEnd type="none" w="med" len="med"/>
+                    </a:lnL>
+                    <a:lnR w="12700" cap="flat" cmpd="sng" algn="ctr">
+                      <a:solidFill>
+                        <a:schemeClr val="tx1"/>
+                      </a:solidFill>
+                      <a:prstDash val="solid"/>
+                      <a:round/>
+                      <a:headEnd type="none" w="med" len="med"/>
+                      <a:tailEnd type="none" w="med" len="med"/>
+                    </a:lnR>
+                    <a:lnT w="12700" cap="flat" cmpd="sng" algn="ctr">
+                      <a:solidFill>
+                        <a:schemeClr val="tx1"/>
+                      </a:solidFill>
+                      <a:prstDash val="solid"/>
+                      <a:round/>
+                      <a:headEnd type="none" w="med" len="med"/>
+                      <a:tailEnd type="none" w="med" len="med"/>
+                    </a:lnT>
+                    <a:lnB w="12700" cap="flat" cmpd="sng" algn="ctr">
+                      <a:solidFill>
+                        <a:schemeClr val="tx1"/>
+                      </a:solidFill>
+                      <a:prstDash val="solid"/>
+                      <a:round/>
+                      <a:headEnd type="none" w="med" len="med"/>
+                      <a:tailEnd type="none" w="med" len="med"/>
+                    </a:lnB>
+                    <a:solidFill>
+                      <a:schemeClr val="bg1"/>
+                    </a:solidFill>
+                  </a:tcPr>
+                </a:tc>
+                <a:tc>
+                  <a:txBody>
+                    <a:bodyPr/>
+                    <a:lstStyle/>
+                    <a:p>
+                      <a:endParaRPr lang="en-US"/>
+                    </a:p>
+                  </a:txBody>
+                  <a:tcPr>
+                    <a:lnL w="12700" cap="flat" cmpd="sng" algn="ctr">
+                      <a:solidFill>
+                        <a:schemeClr val="tx1"/>
+                      </a:solidFill>
+                      <a:prstDash val="solid"/>
+                      <a:round/>
+                      <a:headEnd type="none" w="med" len="med"/>
+                      <a:tailEnd type="none" w="med" len="med"/>
+                    </a:lnL>
+                    <a:lnR w="12700" cap="flat" cmpd="sng" algn="ctr">
+                      <a:solidFill>
+                        <a:schemeClr val="tx1"/>
+                      </a:solidFill>
+                      <a:prstDash val="solid"/>
+                      <a:round/>
+                      <a:headEnd type="none" w="med" len="med"/>
+                      <a:tailEnd type="none" w="med" len="med"/>
+                    </a:lnR>
+                    <a:lnT w="12700" cap="flat" cmpd="sng" algn="ctr">
+                      <a:solidFill>
+                        <a:schemeClr val="tx1"/>
+                      </a:solidFill>
+                      <a:prstDash val="solid"/>
+                      <a:round/>
+                      <a:headEnd type="none" w="med" len="med"/>
+                      <a:tailEnd type="none" w="med" len="med"/>
+                    </a:lnT>
+                    <a:lnB w="12700" cap="flat" cmpd="sng" algn="ctr">
+                      <a:solidFill>
+                        <a:schemeClr val="tx1"/>
+                      </a:solidFill>
+                      <a:prstDash val="solid"/>
+                      <a:round/>
+                      <a:headEnd type="none" w="med" len="med"/>
+                      <a:tailEnd type="none" w="med" len="med"/>
+                    </a:lnB>
+                    <a:solidFill>
+                      <a:schemeClr val="bg1"/>
+                    </a:solidFill>
+                  </a:tcPr>
+                </a:tc>
+                <a:tc>
+                  <a:txBody>
+                    <a:bodyPr/>
+                    <a:lstStyle/>
+                    <a:p>
+                      <a:endParaRPr lang="en-US"/>
+                    </a:p>
+                  </a:txBody>
+                  <a:tcPr>
+                    <a:lnL w="12700" cap="flat" cmpd="sng" algn="ctr">
+                      <a:solidFill>
+                        <a:schemeClr val="tx1"/>
+                      </a:solidFill>
+                      <a:prstDash val="solid"/>
+                      <a:round/>
+                      <a:headEnd type="none" w="med" len="med"/>
+                      <a:tailEnd type="none" w="med" len="med"/>
+                    </a:lnL>
+                    <a:lnR w="12700" cap="flat" cmpd="sng" algn="ctr">
+                      <a:solidFill>
+                        <a:schemeClr val="tx1"/>
+                      </a:solidFill>
+                      <a:prstDash val="solid"/>
+                      <a:round/>
+                      <a:headEnd type="none" w="med" len="med"/>
+                      <a:tailEnd type="none" w="med" len="med"/>
+                    </a:lnR>
+                    <a:lnT w="12700" cap="flat" cmpd="sng" algn="ctr">
+                      <a:solidFill>
+                        <a:schemeClr val="tx1"/>
+                      </a:solidFill>
+                      <a:prstDash val="solid"/>
+                      <a:round/>
+                      <a:headEnd type="none" w="med" len="med"/>
+                      <a:tailEnd type="none" w="med" len="med"/>
+                    </a:lnT>
+                    <a:lnB w="12700" cap="flat" cmpd="sng" algn="ctr">
+                      <a:solidFill>
+                        <a:schemeClr val="tx1"/>
+                      </a:solidFill>
+                      <a:prstDash val="solid"/>
+                      <a:round/>
+                      <a:headEnd type="none" w="med" len="med"/>
+                      <a:tailEnd type="none" w="med" len="med"/>
+                    </a:lnB>
+                    <a:solidFill>
+                      <a:schemeClr val="bg1"/>
+                    </a:solidFill>
+                  </a:tcPr>
+                </a:tc>
+                <a:tc>
+                  <a:txBody>
+                    <a:bodyPr/>
+                    <a:lstStyle/>
+                    <a:p>
+                      <a:endParaRPr lang="en-US" dirty="0"/>
+                    </a:p>
+                  </a:txBody>
+                  <a:tcPr>
+                    <a:lnL w="12700" cap="flat" cmpd="sng" algn="ctr">
+                      <a:solidFill>
+                        <a:schemeClr val="tx1"/>
+                      </a:solidFill>
+                      <a:prstDash val="solid"/>
+                      <a:round/>
+                      <a:headEnd type="none" w="med" len="med"/>
+                      <a:tailEnd type="none" w="med" len="med"/>
+                    </a:lnL>
+                    <a:lnR w="12700" cap="flat" cmpd="sng" algn="ctr">
+                      <a:solidFill>
+                        <a:schemeClr val="tx1"/>
+                      </a:solidFill>
+                      <a:prstDash val="solid"/>
+                      <a:round/>
+                      <a:headEnd type="none" w="med" len="med"/>
+                      <a:tailEnd type="none" w="med" len="med"/>
+                    </a:lnR>
+                    <a:lnT w="12700" cap="flat" cmpd="sng" algn="ctr">
+                      <a:solidFill>
+                        <a:schemeClr val="tx1"/>
+                      </a:solidFill>
+                      <a:prstDash val="solid"/>
+                      <a:round/>
+                      <a:headEnd type="none" w="med" len="med"/>
+                      <a:tailEnd type="none" w="med" len="med"/>
+                    </a:lnT>
+                    <a:lnB w="12700" cap="flat" cmpd="sng" algn="ctr">
+                      <a:solidFill>
+                        <a:schemeClr val="tx1"/>
+                      </a:solidFill>
+                      <a:prstDash val="solid"/>
+                      <a:round/>
+                      <a:headEnd type="none" w="med" len="med"/>
+                      <a:tailEnd type="none" w="med" len="med"/>
+                    </a:lnB>
+                    <a:solidFill>
+                      <a:schemeClr val="bg1"/>
+                    </a:solidFill>
+                  </a:tcPr>
+                </a:tc>
+                <a:tc>
+                  <a:txBody>
+                    <a:bodyPr/>
+                    <a:lstStyle/>
+                    <a:p>
+                      <a:endParaRPr lang="en-US" dirty="0"/>
+                    </a:p>
+                  </a:txBody>
+                  <a:tcPr>
+                    <a:lnL w="12700" cap="flat" cmpd="sng" algn="ctr">
+                      <a:solidFill>
+                        <a:schemeClr val="tx1"/>
+                      </a:solidFill>
+                      <a:prstDash val="solid"/>
+                      <a:round/>
+                      <a:headEnd type="none" w="med" len="med"/>
+                      <a:tailEnd type="none" w="med" len="med"/>
+                    </a:lnL>
+                    <a:lnR w="12700" cap="flat" cmpd="sng" algn="ctr">
+                      <a:solidFill>
+                        <a:schemeClr val="tx1"/>
+                      </a:solidFill>
+                      <a:prstDash val="solid"/>
+                      <a:round/>
+                      <a:headEnd type="none" w="med" len="med"/>
+                      <a:tailEnd type="none" w="med" len="med"/>
+                    </a:lnR>
+                    <a:lnT w="12700" cap="flat" cmpd="sng" algn="ctr">
+                      <a:solidFill>
+                        <a:schemeClr val="tx1"/>
+                      </a:solidFill>
+                      <a:prstDash val="solid"/>
+                      <a:round/>
+                      <a:headEnd type="none" w="med" len="med"/>
+                      <a:tailEnd type="none" w="med" len="med"/>
+                    </a:lnT>
+                    <a:lnB w="12700" cap="flat" cmpd="sng" algn="ctr">
+                      <a:solidFill>
+                        <a:schemeClr val="tx1"/>
+                      </a:solidFill>
+                      <a:prstDash val="solid"/>
+                      <a:round/>
+                      <a:headEnd type="none" w="med" len="med"/>
+                      <a:tailEnd type="none" w="med" len="med"/>
+                    </a:lnB>
+                    <a:solidFill>
+                      <a:schemeClr val="bg1"/>
+                    </a:solidFill>
+                  </a:tcPr>
+                </a:tc>
+                <a:tc>
+                  <a:txBody>
+                    <a:bodyPr/>
+                    <a:lstStyle/>
+                    <a:p>
+                      <a:endParaRPr lang="en-US" dirty="0"/>
+                    </a:p>
+                  </a:txBody>
+                  <a:tcPr>
+                    <a:lnL w="12700" cap="flat" cmpd="sng" algn="ctr">
+                      <a:solidFill>
+                        <a:schemeClr val="tx1"/>
+                      </a:solidFill>
+                      <a:prstDash val="solid"/>
+                      <a:round/>
+                      <a:headEnd type="none" w="med" len="med"/>
+                      <a:tailEnd type="none" w="med" len="med"/>
+                    </a:lnL>
+                    <a:lnR w="12700" cap="flat" cmpd="sng" algn="ctr">
+                      <a:solidFill>
+                        <a:schemeClr val="tx1"/>
+                      </a:solidFill>
+                      <a:prstDash val="solid"/>
+                      <a:round/>
+                      <a:headEnd type="none" w="med" len="med"/>
+                      <a:tailEnd type="none" w="med" len="med"/>
+                    </a:lnR>
+                    <a:lnT w="12700" cap="flat" cmpd="sng" algn="ctr">
+                      <a:solidFill>
+                        <a:schemeClr val="tx1"/>
+                      </a:solidFill>
+                      <a:prstDash val="solid"/>
+                      <a:round/>
+                      <a:headEnd type="none" w="med" len="med"/>
+                      <a:tailEnd type="none" w="med" len="med"/>
+                    </a:lnT>
+                    <a:lnB w="12700" cap="flat" cmpd="sng" algn="ctr">
+                      <a:solidFill>
+                        <a:schemeClr val="tx1"/>
+                      </a:solidFill>
+                      <a:prstDash val="solid"/>
+                      <a:round/>
+                      <a:headEnd type="none" w="med" len="med"/>
+                      <a:tailEnd type="none" w="med" len="med"/>
+                    </a:lnB>
+                    <a:solidFill>
+                      <a:schemeClr val="bg1"/>
+                    </a:solidFill>
+                  </a:tcPr>
+                </a:tc>
+                <a:extLst>
+                  <a:ext uri="{0D108BD9-81ED-4DB2-BD59-A6C34878D82A}">
+                    <a16:rowId xmlns:a16="http://schemas.microsoft.com/office/drawing/2014/main" val="1109871911"/>
+                  </a:ext>
+                </a:extLst>
+              </a:tr>
+            </a:tbl>
+          </a:graphicData>
+        </a:graphic>
+      </p:graphicFrame>
+      <p:pic>
+        <p:nvPicPr>
+          <p:cNvPr id="4" name="Picture 3" descr="Shape&#10;&#10;Description automatically generated with low confidence">
+            <a:extLst>
+              <a:ext uri="{FF2B5EF4-FFF2-40B4-BE49-F238E27FC236}">
+                <a16:creationId xmlns:a16="http://schemas.microsoft.com/office/drawing/2014/main" id="{7C19CDD0-56A8-4726-8FE3-4C3253C276AF}"/>
+              </a:ext>
+            </a:extLst>
+          </p:cNvPr>
+          <p:cNvPicPr>
+            <a:picLocks noChangeAspect="1"/>
+          </p:cNvPicPr>
+          <p:nvPr/>
+        </p:nvPicPr>
+        <p:blipFill>
+          <a:blip r:embed="rId2">
+            <a:extLst>
+              <a:ext uri="{28A0092B-C50C-407E-A947-70E740481C1C}">
+                <a14:useLocalDpi xmlns:a14="http://schemas.microsoft.com/office/drawing/2010/main" val="0"/>
+              </a:ext>
+            </a:extLst>
+          </a:blip>
+          <a:stretch>
+            <a:fillRect/>
+          </a:stretch>
+        </p:blipFill>
+        <p:spPr>
+          <a:xfrm flipH="1">
+            <a:off x="3199004" y="4295164"/>
+            <a:ext cx="759204" cy="759204"/>
+          </a:xfrm>
+          <a:prstGeom prst="rect">
+            <a:avLst/>
+          </a:prstGeom>
+        </p:spPr>
+      </p:pic>
+      <p:pic>
+        <p:nvPicPr>
+          <p:cNvPr id="6" name="Picture 5" descr="A picture containing building&#10;&#10;Description automatically generated">
+            <a:extLst>
+              <a:ext uri="{FF2B5EF4-FFF2-40B4-BE49-F238E27FC236}">
+                <a16:creationId xmlns:a16="http://schemas.microsoft.com/office/drawing/2014/main" id="{FCB327E9-7FC8-49C2-A88A-C0E870886125}"/>
+              </a:ext>
+            </a:extLst>
+          </p:cNvPr>
+          <p:cNvPicPr>
+            <a:picLocks noChangeAspect="1"/>
+          </p:cNvPicPr>
+          <p:nvPr/>
+        </p:nvPicPr>
+        <p:blipFill>
+          <a:blip r:embed="rId3">
+            <a:extLst>
+              <a:ext uri="{28A0092B-C50C-407E-A947-70E740481C1C}">
+                <a14:useLocalDpi xmlns:a14="http://schemas.microsoft.com/office/drawing/2010/main" val="0"/>
+              </a:ext>
+            </a:extLst>
+          </a:blip>
+          <a:stretch>
+            <a:fillRect/>
+          </a:stretch>
+        </p:blipFill>
+        <p:spPr>
+          <a:xfrm>
+            <a:off x="9277043" y="327171"/>
+            <a:ext cx="611350" cy="611350"/>
+          </a:xfrm>
+          <a:prstGeom prst="rect">
+            <a:avLst/>
+          </a:prstGeom>
+        </p:spPr>
+      </p:pic>
+      <p:pic>
+        <p:nvPicPr>
+          <p:cNvPr id="8" name="Picture 7" descr="Shape&#10;&#10;Description automatically generated with low confidence">
+            <a:extLst>
+              <a:ext uri="{FF2B5EF4-FFF2-40B4-BE49-F238E27FC236}">
+                <a16:creationId xmlns:a16="http://schemas.microsoft.com/office/drawing/2014/main" id="{6C03E69D-6EAD-478A-823F-2A4E06AA5682}"/>
+              </a:ext>
+            </a:extLst>
+          </p:cNvPr>
+          <p:cNvPicPr>
+            <a:picLocks noChangeAspect="1"/>
+          </p:cNvPicPr>
+          <p:nvPr/>
+        </p:nvPicPr>
+        <p:blipFill>
+          <a:blip r:embed="rId4">
+            <a:extLst>
+              <a:ext uri="{28A0092B-C50C-407E-A947-70E740481C1C}">
+                <a14:useLocalDpi xmlns:a14="http://schemas.microsoft.com/office/drawing/2010/main" val="0"/>
+              </a:ext>
+            </a:extLst>
+          </a:blip>
+          <a:stretch>
+            <a:fillRect/>
+          </a:stretch>
+        </p:blipFill>
+        <p:spPr>
+          <a:xfrm>
+            <a:off x="5755369" y="1044169"/>
+            <a:ext cx="788042" cy="788042"/>
+          </a:xfrm>
+          <a:prstGeom prst="rect">
+            <a:avLst/>
+          </a:prstGeom>
+        </p:spPr>
+      </p:pic>
+      <p:pic>
+        <p:nvPicPr>
+          <p:cNvPr id="10" name="Picture 9" descr="Shape&#10;&#10;Description automatically generated with low confidence">
+            <a:extLst>
+              <a:ext uri="{FF2B5EF4-FFF2-40B4-BE49-F238E27FC236}">
+                <a16:creationId xmlns:a16="http://schemas.microsoft.com/office/drawing/2014/main" id="{AACDC302-E420-47F6-9BDD-B653ABFC563C}"/>
+              </a:ext>
+            </a:extLst>
+          </p:cNvPr>
+          <p:cNvPicPr>
+            <a:picLocks noChangeAspect="1"/>
+          </p:cNvPicPr>
+          <p:nvPr/>
+        </p:nvPicPr>
+        <p:blipFill>
+          <a:blip r:embed="rId4">
+            <a:extLst>
+              <a:ext uri="{28A0092B-C50C-407E-A947-70E740481C1C}">
+                <a14:useLocalDpi xmlns:a14="http://schemas.microsoft.com/office/drawing/2010/main" val="0"/>
+              </a:ext>
+            </a:extLst>
+          </a:blip>
+          <a:stretch>
+            <a:fillRect/>
+          </a:stretch>
+        </p:blipFill>
+        <p:spPr>
+          <a:xfrm>
+            <a:off x="8334986" y="3481431"/>
+            <a:ext cx="788042" cy="788042"/>
+          </a:xfrm>
+          <a:prstGeom prst="rect">
+            <a:avLst/>
+          </a:prstGeom>
+        </p:spPr>
+      </p:pic>
+      <p:pic>
+        <p:nvPicPr>
+          <p:cNvPr id="12" name="Picture 11" descr="Shape&#10;&#10;Description automatically generated with low confidence">
+            <a:extLst>
+              <a:ext uri="{FF2B5EF4-FFF2-40B4-BE49-F238E27FC236}">
+                <a16:creationId xmlns:a16="http://schemas.microsoft.com/office/drawing/2014/main" id="{F31D8E74-808D-4C33-B56E-530124CC92FD}"/>
+              </a:ext>
+            </a:extLst>
+          </p:cNvPr>
+          <p:cNvPicPr>
+            <a:picLocks noChangeAspect="1"/>
+          </p:cNvPicPr>
+          <p:nvPr/>
+        </p:nvPicPr>
+        <p:blipFill>
+          <a:blip r:embed="rId4">
+            <a:extLst>
+              <a:ext uri="{28A0092B-C50C-407E-A947-70E740481C1C}">
+                <a14:useLocalDpi xmlns:a14="http://schemas.microsoft.com/office/drawing/2010/main" val="0"/>
+              </a:ext>
+            </a:extLst>
+          </a:blip>
+          <a:stretch>
+            <a:fillRect/>
+          </a:stretch>
+        </p:blipFill>
+        <p:spPr>
+          <a:xfrm>
+            <a:off x="3190615" y="1850911"/>
+            <a:ext cx="788042" cy="788042"/>
+          </a:xfrm>
+          <a:prstGeom prst="rect">
+            <a:avLst/>
+          </a:prstGeom>
+        </p:spPr>
+      </p:pic>
+      <p:pic>
+        <p:nvPicPr>
+          <p:cNvPr id="13" name="Picture 12" descr="Shape&#10;&#10;Description automatically generated with low confidence">
+            <a:extLst>
+              <a:ext uri="{FF2B5EF4-FFF2-40B4-BE49-F238E27FC236}">
+                <a16:creationId xmlns:a16="http://schemas.microsoft.com/office/drawing/2014/main" id="{46292467-EF5D-4707-8BD2-CDBA9A9FA23E}"/>
+              </a:ext>
+            </a:extLst>
+          </p:cNvPr>
+          <p:cNvPicPr>
+            <a:picLocks noChangeAspect="1"/>
+          </p:cNvPicPr>
+          <p:nvPr/>
+        </p:nvPicPr>
+        <p:blipFill>
+          <a:blip r:embed="rId4">
+            <a:extLst>
+              <a:ext uri="{28A0092B-C50C-407E-A947-70E740481C1C}">
+                <a14:useLocalDpi xmlns:a14="http://schemas.microsoft.com/office/drawing/2010/main" val="0"/>
+              </a:ext>
+            </a:extLst>
+          </a:blip>
+          <a:stretch>
+            <a:fillRect/>
+          </a:stretch>
+        </p:blipFill>
+        <p:spPr>
+          <a:xfrm>
+            <a:off x="4038248" y="5100509"/>
+            <a:ext cx="788042" cy="788042"/>
+          </a:xfrm>
+          <a:prstGeom prst="rect">
+            <a:avLst/>
+          </a:prstGeom>
+        </p:spPr>
+      </p:pic>
+      <p:pic>
+        <p:nvPicPr>
+          <p:cNvPr id="14" name="Picture 13" descr="Shape&#10;&#10;Description automatically generated with low confidence">
+            <a:extLst>
+              <a:ext uri="{FF2B5EF4-FFF2-40B4-BE49-F238E27FC236}">
+                <a16:creationId xmlns:a16="http://schemas.microsoft.com/office/drawing/2014/main" id="{1BCD88E6-5351-44FF-A615-751153CC7321}"/>
+              </a:ext>
+            </a:extLst>
+          </p:cNvPr>
+          <p:cNvPicPr>
+            <a:picLocks noChangeAspect="1"/>
+          </p:cNvPicPr>
+          <p:nvPr/>
+        </p:nvPicPr>
+        <p:blipFill>
+          <a:blip r:embed="rId4">
+            <a:extLst>
+              <a:ext uri="{28A0092B-C50C-407E-A947-70E740481C1C}">
+                <a14:useLocalDpi xmlns:a14="http://schemas.microsoft.com/office/drawing/2010/main" val="0"/>
+              </a:ext>
+            </a:extLst>
+          </a:blip>
+          <a:stretch>
+            <a:fillRect/>
+          </a:stretch>
+        </p:blipFill>
+        <p:spPr>
+          <a:xfrm>
+            <a:off x="6607376" y="5914242"/>
+            <a:ext cx="788042" cy="788042"/>
+          </a:xfrm>
+          <a:prstGeom prst="rect">
+            <a:avLst/>
+          </a:prstGeom>
+        </p:spPr>
+      </p:pic>
+      <p:pic>
+        <p:nvPicPr>
+          <p:cNvPr id="15" name="Picture 14" descr="Shape&#10;&#10;Description automatically generated with low confidence">
+            <a:extLst>
+              <a:ext uri="{FF2B5EF4-FFF2-40B4-BE49-F238E27FC236}">
+                <a16:creationId xmlns:a16="http://schemas.microsoft.com/office/drawing/2014/main" id="{175610E1-0041-46EE-AD0E-68ECA93CD5BF}"/>
+              </a:ext>
+            </a:extLst>
+          </p:cNvPr>
+          <p:cNvPicPr>
+            <a:picLocks noChangeAspect="1"/>
+          </p:cNvPicPr>
+          <p:nvPr/>
+        </p:nvPicPr>
+        <p:blipFill>
+          <a:blip r:embed="rId4">
+            <a:extLst>
+              <a:ext uri="{28A0092B-C50C-407E-A947-70E740481C1C}">
+                <a14:useLocalDpi xmlns:a14="http://schemas.microsoft.com/office/drawing/2010/main" val="0"/>
+              </a:ext>
+            </a:extLst>
+          </a:blip>
+          <a:stretch>
+            <a:fillRect/>
+          </a:stretch>
+        </p:blipFill>
+        <p:spPr>
+          <a:xfrm>
+            <a:off x="4903624" y="4295689"/>
+            <a:ext cx="788042" cy="788042"/>
+          </a:xfrm>
+          <a:prstGeom prst="rect">
+            <a:avLst/>
+          </a:prstGeom>
+        </p:spPr>
+      </p:pic>
+      <p:pic>
+        <p:nvPicPr>
+          <p:cNvPr id="16" name="Picture 15" descr="Shape&#10;&#10;Description automatically generated with low confidence">
+            <a:extLst>
+              <a:ext uri="{FF2B5EF4-FFF2-40B4-BE49-F238E27FC236}">
+                <a16:creationId xmlns:a16="http://schemas.microsoft.com/office/drawing/2014/main" id="{3154325F-4AF7-4390-B081-7216A0B39FEF}"/>
+              </a:ext>
+            </a:extLst>
+          </p:cNvPr>
+          <p:cNvPicPr>
+            <a:picLocks noChangeAspect="1"/>
+          </p:cNvPicPr>
+          <p:nvPr/>
+        </p:nvPicPr>
+        <p:blipFill>
+          <a:blip r:embed="rId4">
+            <a:extLst>
+              <a:ext uri="{28A0092B-C50C-407E-A947-70E740481C1C}">
+                <a14:useLocalDpi xmlns:a14="http://schemas.microsoft.com/office/drawing/2010/main" val="0"/>
+              </a:ext>
+            </a:extLst>
+          </a:blip>
+          <a:stretch>
+            <a:fillRect/>
+          </a:stretch>
+        </p:blipFill>
+        <p:spPr>
+          <a:xfrm>
+            <a:off x="6612445" y="1037178"/>
+            <a:ext cx="788042" cy="788042"/>
+          </a:xfrm>
+          <a:prstGeom prst="rect">
+            <a:avLst/>
+          </a:prstGeom>
+        </p:spPr>
+      </p:pic>
+      <p:pic>
+        <p:nvPicPr>
+          <p:cNvPr id="17" name="Picture 16" descr="Shape&#10;&#10;Description automatically generated with low confidence">
+            <a:extLst>
+              <a:ext uri="{FF2B5EF4-FFF2-40B4-BE49-F238E27FC236}">
+                <a16:creationId xmlns:a16="http://schemas.microsoft.com/office/drawing/2014/main" id="{6F9ADAC0-3BA2-4F49-8E36-93D3BC513AD8}"/>
+              </a:ext>
+            </a:extLst>
+          </p:cNvPr>
+          <p:cNvPicPr>
+            <a:picLocks noChangeAspect="1"/>
+          </p:cNvPicPr>
+          <p:nvPr/>
+        </p:nvPicPr>
+        <p:blipFill>
+          <a:blip r:embed="rId4">
+            <a:extLst>
+              <a:ext uri="{28A0092B-C50C-407E-A947-70E740481C1C}">
+                <a14:useLocalDpi xmlns:a14="http://schemas.microsoft.com/office/drawing/2010/main" val="0"/>
+              </a:ext>
+            </a:extLst>
+          </a:blip>
+          <a:stretch>
+            <a:fillRect/>
+          </a:stretch>
+        </p:blipFill>
+        <p:spPr>
+          <a:xfrm>
+            <a:off x="7469956" y="1044169"/>
+            <a:ext cx="788042" cy="788042"/>
+          </a:xfrm>
+          <a:prstGeom prst="rect">
+            <a:avLst/>
+          </a:prstGeom>
+        </p:spPr>
+      </p:pic>
+      <p:pic>
+        <p:nvPicPr>
+          <p:cNvPr id="19" name="Picture 18" descr="A picture containing tool&#10;&#10;Description automatically generated">
+            <a:extLst>
+              <a:ext uri="{FF2B5EF4-FFF2-40B4-BE49-F238E27FC236}">
+                <a16:creationId xmlns:a16="http://schemas.microsoft.com/office/drawing/2014/main" id="{6BE75FA8-362D-4ABA-BBC2-C890DAEC2A27}"/>
+              </a:ext>
+            </a:extLst>
+          </p:cNvPr>
+          <p:cNvPicPr>
+            <a:picLocks noChangeAspect="1"/>
+          </p:cNvPicPr>
+          <p:nvPr/>
+        </p:nvPicPr>
+        <p:blipFill>
+          <a:blip r:embed="rId5">
+            <a:extLst>
+              <a:ext uri="{28A0092B-C50C-407E-A947-70E740481C1C}">
+                <a14:useLocalDpi xmlns:a14="http://schemas.microsoft.com/office/drawing/2010/main" val="0"/>
+              </a:ext>
+            </a:extLst>
+          </a:blip>
+          <a:stretch>
+            <a:fillRect/>
+          </a:stretch>
+        </p:blipFill>
+        <p:spPr>
+          <a:xfrm>
+            <a:off x="9205475" y="3506598"/>
+            <a:ext cx="699696" cy="699696"/>
+          </a:xfrm>
+          <a:prstGeom prst="rect">
+            <a:avLst/>
+          </a:prstGeom>
+        </p:spPr>
+      </p:pic>
+      <p:pic>
+        <p:nvPicPr>
+          <p:cNvPr id="20" name="Picture 19" descr="Shape&#10;&#10;Description automatically generated with low confidence">
+            <a:extLst>
+              <a:ext uri="{FF2B5EF4-FFF2-40B4-BE49-F238E27FC236}">
+                <a16:creationId xmlns:a16="http://schemas.microsoft.com/office/drawing/2014/main" id="{6DA6ADE6-A9CC-4D0A-A7FD-05A11AB7864F}"/>
+              </a:ext>
+            </a:extLst>
+          </p:cNvPr>
+          <p:cNvPicPr>
+            <a:picLocks noChangeAspect="1"/>
+          </p:cNvPicPr>
+          <p:nvPr/>
+        </p:nvPicPr>
+        <p:blipFill>
+          <a:blip r:embed="rId4">
+            <a:extLst>
+              <a:ext uri="{28A0092B-C50C-407E-A947-70E740481C1C}">
+                <a14:useLocalDpi xmlns:a14="http://schemas.microsoft.com/office/drawing/2010/main" val="0"/>
+              </a:ext>
+            </a:extLst>
+          </a:blip>
+          <a:stretch>
+            <a:fillRect/>
+          </a:stretch>
+        </p:blipFill>
+        <p:spPr>
+          <a:xfrm>
+            <a:off x="4038248" y="235156"/>
+            <a:ext cx="788042" cy="788042"/>
+          </a:xfrm>
+          <a:prstGeom prst="rect">
+            <a:avLst/>
+          </a:prstGeom>
+        </p:spPr>
+      </p:pic>
+      <p:pic>
+        <p:nvPicPr>
+          <p:cNvPr id="21" name="Picture 20" descr="Shape&#10;&#10;Description automatically generated with low confidence">
+            <a:extLst>
+              <a:ext uri="{FF2B5EF4-FFF2-40B4-BE49-F238E27FC236}">
+                <a16:creationId xmlns:a16="http://schemas.microsoft.com/office/drawing/2014/main" id="{FEF34946-C755-4077-BC96-6AB61BC81FC4}"/>
+              </a:ext>
+            </a:extLst>
+          </p:cNvPr>
+          <p:cNvPicPr>
+            <a:picLocks noChangeAspect="1"/>
+          </p:cNvPicPr>
+          <p:nvPr/>
+        </p:nvPicPr>
+        <p:blipFill>
+          <a:blip r:embed="rId2">
+            <a:extLst>
+              <a:ext uri="{28A0092B-C50C-407E-A947-70E740481C1C}">
+                <a14:useLocalDpi xmlns:a14="http://schemas.microsoft.com/office/drawing/2010/main" val="0"/>
+              </a:ext>
+            </a:extLst>
+          </a:blip>
+          <a:stretch>
+            <a:fillRect/>
+          </a:stretch>
+        </p:blipFill>
+        <p:spPr>
+          <a:xfrm flipH="1">
+            <a:off x="3199004" y="1058151"/>
+            <a:ext cx="759204" cy="759204"/>
+          </a:xfrm>
+          <a:prstGeom prst="rect">
+            <a:avLst/>
+          </a:prstGeom>
+        </p:spPr>
+      </p:pic>
+      <p:pic>
+        <p:nvPicPr>
+          <p:cNvPr id="24" name="Picture 23" descr="Icon&#10;&#10;Description automatically generated">
+            <a:extLst>
+              <a:ext uri="{FF2B5EF4-FFF2-40B4-BE49-F238E27FC236}">
+                <a16:creationId xmlns:a16="http://schemas.microsoft.com/office/drawing/2014/main" id="{41A6A129-4255-4886-B638-6689EF7860AA}"/>
+              </a:ext>
+            </a:extLst>
+          </p:cNvPr>
+          <p:cNvPicPr>
+            <a:picLocks noChangeAspect="1"/>
+          </p:cNvPicPr>
+          <p:nvPr/>
+        </p:nvPicPr>
+        <p:blipFill>
+          <a:blip r:embed="rId6">
+            <a:extLst>
+              <a:ext uri="{28A0092B-C50C-407E-A947-70E740481C1C}">
+                <a14:useLocalDpi xmlns:a14="http://schemas.microsoft.com/office/drawing/2010/main" val="0"/>
+              </a:ext>
+            </a:extLst>
+          </a:blip>
+          <a:stretch>
+            <a:fillRect/>
+          </a:stretch>
+        </p:blipFill>
+        <p:spPr>
+          <a:xfrm>
+            <a:off x="8368126" y="5938885"/>
+            <a:ext cx="717151" cy="717151"/>
+          </a:xfrm>
+          <a:prstGeom prst="rect">
+            <a:avLst/>
+          </a:prstGeom>
+        </p:spPr>
+      </p:pic>
+      <p:pic>
+        <p:nvPicPr>
+          <p:cNvPr id="26" name="Picture 25" descr="Shape&#10;&#10;Description automatically generated with low confidence">
+            <a:extLst>
+              <a:ext uri="{FF2B5EF4-FFF2-40B4-BE49-F238E27FC236}">
+                <a16:creationId xmlns:a16="http://schemas.microsoft.com/office/drawing/2014/main" id="{3A740241-21AD-4AB5-AEB0-792A28CF4CC0}"/>
+              </a:ext>
+            </a:extLst>
+          </p:cNvPr>
+          <p:cNvPicPr>
+            <a:picLocks noChangeAspect="1"/>
+          </p:cNvPicPr>
+          <p:nvPr/>
+        </p:nvPicPr>
+        <p:blipFill>
+          <a:blip r:embed="rId7">
+            <a:extLst>
+              <a:ext uri="{28A0092B-C50C-407E-A947-70E740481C1C}">
+                <a14:useLocalDpi xmlns:a14="http://schemas.microsoft.com/office/drawing/2010/main" val="0"/>
+              </a:ext>
+            </a:extLst>
+          </a:blip>
+          <a:stretch>
+            <a:fillRect/>
+          </a:stretch>
+        </p:blipFill>
+        <p:spPr>
+          <a:xfrm>
+            <a:off x="6620304" y="5092644"/>
+            <a:ext cx="788042" cy="788042"/>
+          </a:xfrm>
+          <a:prstGeom prst="rect">
+            <a:avLst/>
+          </a:prstGeom>
+        </p:spPr>
+      </p:pic>
+      <p:pic>
+        <p:nvPicPr>
+          <p:cNvPr id="29" name="Picture 28" descr="Shape&#10;&#10;Description automatically generated with low confidence">
+            <a:extLst>
+              <a:ext uri="{FF2B5EF4-FFF2-40B4-BE49-F238E27FC236}">
+                <a16:creationId xmlns:a16="http://schemas.microsoft.com/office/drawing/2014/main" id="{D857F951-B28A-42BD-8948-10FD4C1A76A2}"/>
+              </a:ext>
+            </a:extLst>
+          </p:cNvPr>
+          <p:cNvPicPr>
+            <a:picLocks noChangeAspect="1"/>
+          </p:cNvPicPr>
+          <p:nvPr/>
+        </p:nvPicPr>
+        <p:blipFill>
+          <a:blip r:embed="rId7">
+            <a:extLst>
+              <a:ext uri="{28A0092B-C50C-407E-A947-70E740481C1C}">
+                <a14:useLocalDpi xmlns:a14="http://schemas.microsoft.com/office/drawing/2010/main" val="0"/>
+              </a:ext>
+            </a:extLst>
+          </a:blip>
+          <a:stretch>
+            <a:fillRect/>
+          </a:stretch>
+        </p:blipFill>
+        <p:spPr>
+          <a:xfrm>
+            <a:off x="5755369" y="1861835"/>
+            <a:ext cx="788042" cy="788042"/>
+          </a:xfrm>
+          <a:prstGeom prst="rect">
+            <a:avLst/>
+          </a:prstGeom>
+        </p:spPr>
+      </p:pic>
+      <p:pic>
+        <p:nvPicPr>
+          <p:cNvPr id="30" name="Picture 29" descr="Shape&#10;&#10;Description automatically generated with low confidence">
+            <a:extLst>
+              <a:ext uri="{FF2B5EF4-FFF2-40B4-BE49-F238E27FC236}">
+                <a16:creationId xmlns:a16="http://schemas.microsoft.com/office/drawing/2014/main" id="{D0CAB3E2-7A33-4DB5-A729-E8E71F9B4427}"/>
+              </a:ext>
+            </a:extLst>
+          </p:cNvPr>
+          <p:cNvPicPr>
+            <a:picLocks noChangeAspect="1"/>
+          </p:cNvPicPr>
+          <p:nvPr/>
+        </p:nvPicPr>
+        <p:blipFill>
+          <a:blip r:embed="rId4">
+            <a:extLst>
+              <a:ext uri="{28A0092B-C50C-407E-A947-70E740481C1C}">
+                <a14:useLocalDpi xmlns:a14="http://schemas.microsoft.com/office/drawing/2010/main" val="0"/>
+              </a:ext>
+            </a:extLst>
+          </a:blip>
+          <a:stretch>
+            <a:fillRect/>
+          </a:stretch>
+        </p:blipFill>
+        <p:spPr>
+          <a:xfrm>
+            <a:off x="7478345" y="2666655"/>
+            <a:ext cx="788042" cy="788042"/>
+          </a:xfrm>
+          <a:prstGeom prst="rect">
+            <a:avLst/>
+          </a:prstGeom>
+        </p:spPr>
+      </p:pic>
+      <p:pic>
+        <p:nvPicPr>
+          <p:cNvPr id="31" name="Picture 30" descr="Shape&#10;&#10;Description automatically generated with low confidence">
+            <a:extLst>
+              <a:ext uri="{FF2B5EF4-FFF2-40B4-BE49-F238E27FC236}">
+                <a16:creationId xmlns:a16="http://schemas.microsoft.com/office/drawing/2014/main" id="{2D5CFE4E-1532-432A-A662-CE9815F588C8}"/>
+              </a:ext>
+            </a:extLst>
+          </p:cNvPr>
+          <p:cNvPicPr>
+            <a:picLocks noChangeAspect="1"/>
+          </p:cNvPicPr>
+          <p:nvPr/>
+        </p:nvPicPr>
+        <p:blipFill>
+          <a:blip r:embed="rId4">
+            <a:extLst>
+              <a:ext uri="{28A0092B-C50C-407E-A947-70E740481C1C}">
+                <a14:useLocalDpi xmlns:a14="http://schemas.microsoft.com/office/drawing/2010/main" val="0"/>
+              </a:ext>
+            </a:extLst>
+          </a:blip>
+          <a:stretch>
+            <a:fillRect/>
+          </a:stretch>
+        </p:blipFill>
+        <p:spPr>
+          <a:xfrm>
+            <a:off x="4895235" y="3490344"/>
+            <a:ext cx="788042" cy="788042"/>
+          </a:xfrm>
+          <a:prstGeom prst="rect">
+            <a:avLst/>
+          </a:prstGeom>
+        </p:spPr>
+      </p:pic>
+      <p:pic>
+        <p:nvPicPr>
+          <p:cNvPr id="32" name="Picture 31" descr="Shape&#10;&#10;Description automatically generated with low confidence">
+            <a:extLst>
+              <a:ext uri="{FF2B5EF4-FFF2-40B4-BE49-F238E27FC236}">
+                <a16:creationId xmlns:a16="http://schemas.microsoft.com/office/drawing/2014/main" id="{DF44D582-0020-49FD-8DA7-AD8AB1981981}"/>
+              </a:ext>
+            </a:extLst>
+          </p:cNvPr>
+          <p:cNvPicPr>
+            <a:picLocks noChangeAspect="1"/>
+          </p:cNvPicPr>
+          <p:nvPr/>
+        </p:nvPicPr>
+        <p:blipFill>
+          <a:blip r:embed="rId4">
+            <a:extLst>
+              <a:ext uri="{28A0092B-C50C-407E-A947-70E740481C1C}">
+                <a14:useLocalDpi xmlns:a14="http://schemas.microsoft.com/office/drawing/2010/main" val="0"/>
+              </a:ext>
+            </a:extLst>
+          </a:blip>
+          <a:stretch>
+            <a:fillRect/>
+          </a:stretch>
+        </p:blipFill>
+        <p:spPr>
+          <a:xfrm>
+            <a:off x="9188697" y="1853446"/>
+            <a:ext cx="788042" cy="788042"/>
+          </a:xfrm>
+          <a:prstGeom prst="rect">
+            <a:avLst/>
+          </a:prstGeom>
+        </p:spPr>
+      </p:pic>
+    </p:spTree>
+    <p:extLst>
+      <p:ext uri="{BB962C8B-B14F-4D97-AF65-F5344CB8AC3E}">
+        <p14:creationId xmlns:p14="http://schemas.microsoft.com/office/powerpoint/2010/main" val="2648273909"/>
+      </p:ext>
+    </p:extLst>
+  </p:cSld>
+  <p:clrMapOvr>
+    <a:masterClrMapping/>
+  </p:clrMapOvr>
+</p:sld>
+</file>
+
 <file path=ppt/theme/theme1.xml><?xml version="1.0" encoding="utf-8"?>
 <a:theme xmlns:a="http://schemas.openxmlformats.org/drawingml/2006/main" name="Office Theme">
   <a:themeElements>

</xml_diff>

<commit_message>
Add 8 X 8 test case
</commit_message>
<xml_diff>
--- a/Presentation1.pptx
+++ b/Presentation1.pptx
@@ -292,7 +292,7 @@
           <a:p>
             <a:fld id="{C1267A05-D67B-4E4C-868C-590CB66AEB3E}" type="datetimeFigureOut">
               <a:rPr lang="en-US" smtClean="0"/>
-              <a:t>3/1/2023</a:t>
+              <a:t>3/2/2023</a:t>
             </a:fld>
             <a:endParaRPr lang="en-US"/>
           </a:p>
@@ -490,7 +490,7 @@
           <a:p>
             <a:fld id="{C1267A05-D67B-4E4C-868C-590CB66AEB3E}" type="datetimeFigureOut">
               <a:rPr lang="en-US" smtClean="0"/>
-              <a:t>3/1/2023</a:t>
+              <a:t>3/2/2023</a:t>
             </a:fld>
             <a:endParaRPr lang="en-US"/>
           </a:p>
@@ -698,7 +698,7 @@
           <a:p>
             <a:fld id="{C1267A05-D67B-4E4C-868C-590CB66AEB3E}" type="datetimeFigureOut">
               <a:rPr lang="en-US" smtClean="0"/>
-              <a:t>3/1/2023</a:t>
+              <a:t>3/2/2023</a:t>
             </a:fld>
             <a:endParaRPr lang="en-US"/>
           </a:p>
@@ -896,7 +896,7 @@
           <a:p>
             <a:fld id="{C1267A05-D67B-4E4C-868C-590CB66AEB3E}" type="datetimeFigureOut">
               <a:rPr lang="en-US" smtClean="0"/>
-              <a:t>3/1/2023</a:t>
+              <a:t>3/2/2023</a:t>
             </a:fld>
             <a:endParaRPr lang="en-US"/>
           </a:p>
@@ -1171,7 +1171,7 @@
           <a:p>
             <a:fld id="{C1267A05-D67B-4E4C-868C-590CB66AEB3E}" type="datetimeFigureOut">
               <a:rPr lang="en-US" smtClean="0"/>
-              <a:t>3/1/2023</a:t>
+              <a:t>3/2/2023</a:t>
             </a:fld>
             <a:endParaRPr lang="en-US"/>
           </a:p>
@@ -1436,7 +1436,7 @@
           <a:p>
             <a:fld id="{C1267A05-D67B-4E4C-868C-590CB66AEB3E}" type="datetimeFigureOut">
               <a:rPr lang="en-US" smtClean="0"/>
-              <a:t>3/1/2023</a:t>
+              <a:t>3/2/2023</a:t>
             </a:fld>
             <a:endParaRPr lang="en-US"/>
           </a:p>
@@ -1848,7 +1848,7 @@
           <a:p>
             <a:fld id="{C1267A05-D67B-4E4C-868C-590CB66AEB3E}" type="datetimeFigureOut">
               <a:rPr lang="en-US" smtClean="0"/>
-              <a:t>3/1/2023</a:t>
+              <a:t>3/2/2023</a:t>
             </a:fld>
             <a:endParaRPr lang="en-US"/>
           </a:p>
@@ -1989,7 +1989,7 @@
           <a:p>
             <a:fld id="{C1267A05-D67B-4E4C-868C-590CB66AEB3E}" type="datetimeFigureOut">
               <a:rPr lang="en-US" smtClean="0"/>
-              <a:t>3/1/2023</a:t>
+              <a:t>3/2/2023</a:t>
             </a:fld>
             <a:endParaRPr lang="en-US"/>
           </a:p>
@@ -2102,7 +2102,7 @@
           <a:p>
             <a:fld id="{C1267A05-D67B-4E4C-868C-590CB66AEB3E}" type="datetimeFigureOut">
               <a:rPr lang="en-US" smtClean="0"/>
-              <a:t>3/1/2023</a:t>
+              <a:t>3/2/2023</a:t>
             </a:fld>
             <a:endParaRPr lang="en-US"/>
           </a:p>
@@ -2413,7 +2413,7 @@
           <a:p>
             <a:fld id="{C1267A05-D67B-4E4C-868C-590CB66AEB3E}" type="datetimeFigureOut">
               <a:rPr lang="en-US" smtClean="0"/>
-              <a:t>3/1/2023</a:t>
+              <a:t>3/2/2023</a:t>
             </a:fld>
             <a:endParaRPr lang="en-US"/>
           </a:p>
@@ -2701,7 +2701,7 @@
           <a:p>
             <a:fld id="{C1267A05-D67B-4E4C-868C-590CB66AEB3E}" type="datetimeFigureOut">
               <a:rPr lang="en-US" smtClean="0"/>
-              <a:t>3/1/2023</a:t>
+              <a:t>3/2/2023</a:t>
             </a:fld>
             <a:endParaRPr lang="en-US"/>
           </a:p>
@@ -2942,7 +2942,7 @@
           <a:p>
             <a:fld id="{C1267A05-D67B-4E4C-868C-590CB66AEB3E}" type="datetimeFigureOut">
               <a:rPr lang="en-US" smtClean="0"/>
-              <a:t>3/1/2023</a:t>
+              <a:t>3/2/2023</a:t>
             </a:fld>
             <a:endParaRPr lang="en-US"/>
           </a:p>
@@ -10698,7 +10698,7 @@
           <p:nvPr>
             <p:extLst>
               <p:ext uri="{D42A27DB-BD31-4B8C-83A1-F6EECF244321}">
-                <p14:modId xmlns:p14="http://schemas.microsoft.com/office/powerpoint/2010/main" val="2497660591"/>
+                <p14:modId xmlns:p14="http://schemas.microsoft.com/office/powerpoint/2010/main" val="919401299"/>
               </p:ext>
             </p:extLst>
           </p:nvPr>
@@ -10927,7 +10927,7 @@
                     <a:bodyPr/>
                     <a:lstStyle/>
                     <a:p>
-                      <a:endParaRPr lang="en-US"/>
+                      <a:endParaRPr lang="en-US" dirty="0"/>
                     </a:p>
                   </a:txBody>
                   <a:tcPr>
@@ -14715,6 +14715,160 @@
           </a:prstGeom>
         </p:spPr>
       </p:pic>
+      <p:sp>
+        <p:nvSpPr>
+          <p:cNvPr id="3" name="TextBox 2">
+            <a:extLst>
+              <a:ext uri="{FF2B5EF4-FFF2-40B4-BE49-F238E27FC236}">
+                <a16:creationId xmlns:a16="http://schemas.microsoft.com/office/drawing/2014/main" id="{B79B02B8-9883-4A14-88BC-1D484405DE83}"/>
+              </a:ext>
+            </a:extLst>
+          </p:cNvPr>
+          <p:cNvSpPr txBox="1"/>
+          <p:nvPr/>
+        </p:nvSpPr>
+        <p:spPr>
+          <a:xfrm>
+            <a:off x="2659884" y="361542"/>
+            <a:ext cx="453006" cy="6186309"/>
+          </a:xfrm>
+          <a:prstGeom prst="rect">
+            <a:avLst/>
+          </a:prstGeom>
+          <a:noFill/>
+        </p:spPr>
+        <p:txBody>
+          <a:bodyPr wrap="square" rtlCol="0">
+            <a:spAutoFit/>
+          </a:bodyPr>
+          <a:lstStyle/>
+          <a:p>
+            <a:r>
+              <a:rPr lang="en-US" dirty="0"/>
+              <a:t>7</a:t>
+            </a:r>
+          </a:p>
+          <a:p>
+            <a:endParaRPr lang="en-US" dirty="0"/>
+          </a:p>
+          <a:p>
+            <a:endParaRPr lang="en-US" dirty="0"/>
+          </a:p>
+          <a:p>
+            <a:r>
+              <a:rPr lang="en-US" dirty="0"/>
+              <a:t>6</a:t>
+            </a:r>
+          </a:p>
+          <a:p>
+            <a:endParaRPr lang="en-US" dirty="0"/>
+          </a:p>
+          <a:p>
+            <a:endParaRPr lang="en-US" dirty="0"/>
+          </a:p>
+          <a:p>
+            <a:r>
+              <a:rPr lang="en-US" dirty="0"/>
+              <a:t>5</a:t>
+            </a:r>
+          </a:p>
+          <a:p>
+            <a:endParaRPr lang="en-US" dirty="0"/>
+          </a:p>
+          <a:p>
+            <a:endParaRPr lang="en-US" dirty="0"/>
+          </a:p>
+          <a:p>
+            <a:r>
+              <a:rPr lang="en-US" dirty="0"/>
+              <a:t>4</a:t>
+            </a:r>
+          </a:p>
+          <a:p>
+            <a:endParaRPr lang="en-US" dirty="0"/>
+          </a:p>
+          <a:p>
+            <a:endParaRPr lang="en-US" dirty="0"/>
+          </a:p>
+          <a:p>
+            <a:r>
+              <a:rPr lang="en-US" dirty="0"/>
+              <a:t>3</a:t>
+            </a:r>
+          </a:p>
+          <a:p>
+            <a:endParaRPr lang="en-US" dirty="0"/>
+          </a:p>
+          <a:p>
+            <a:endParaRPr lang="en-US" dirty="0"/>
+          </a:p>
+          <a:p>
+            <a:r>
+              <a:rPr lang="en-US" dirty="0"/>
+              <a:t>2</a:t>
+            </a:r>
+          </a:p>
+          <a:p>
+            <a:endParaRPr lang="en-US" dirty="0"/>
+          </a:p>
+          <a:p>
+            <a:endParaRPr lang="en-US" dirty="0"/>
+          </a:p>
+          <a:p>
+            <a:r>
+              <a:rPr lang="en-US" dirty="0"/>
+              <a:t>1</a:t>
+            </a:r>
+          </a:p>
+          <a:p>
+            <a:endParaRPr lang="en-US" dirty="0"/>
+          </a:p>
+          <a:p>
+            <a:endParaRPr lang="en-US" dirty="0"/>
+          </a:p>
+          <a:p>
+            <a:r>
+              <a:rPr lang="en-US" dirty="0"/>
+              <a:t>0</a:t>
+            </a:r>
+          </a:p>
+        </p:txBody>
+      </p:sp>
+      <p:sp>
+        <p:nvSpPr>
+          <p:cNvPr id="5" name="TextBox 4">
+            <a:extLst>
+              <a:ext uri="{FF2B5EF4-FFF2-40B4-BE49-F238E27FC236}">
+                <a16:creationId xmlns:a16="http://schemas.microsoft.com/office/drawing/2014/main" id="{16CDB2FC-2CBD-4CED-BD92-E97DBC0BB0CA}"/>
+              </a:ext>
+            </a:extLst>
+          </p:cNvPr>
+          <p:cNvSpPr txBox="1"/>
+          <p:nvPr/>
+        </p:nvSpPr>
+        <p:spPr>
+          <a:xfrm>
+            <a:off x="3394175" y="6716264"/>
+            <a:ext cx="6706167" cy="369332"/>
+          </a:xfrm>
+          <a:prstGeom prst="rect">
+            <a:avLst/>
+          </a:prstGeom>
+          <a:noFill/>
+        </p:spPr>
+        <p:txBody>
+          <a:bodyPr wrap="square" rtlCol="0">
+            <a:spAutoFit/>
+          </a:bodyPr>
+          <a:lstStyle/>
+          <a:p>
+            <a:r>
+              <a:rPr lang="en-US" dirty="0"/>
+              <a:t>0              1               2              3              4              5               6              7</a:t>
+            </a:r>
+          </a:p>
+        </p:txBody>
+      </p:sp>
     </p:spTree>
     <p:extLst>
       <p:ext uri="{BB962C8B-B14F-4D97-AF65-F5344CB8AC3E}">

</xml_diff>

<commit_message>
Remove pre existing sensors and some buildings
</commit_message>
<xml_diff>
--- a/Presentation1.pptx
+++ b/Presentation1.pptx
@@ -292,7 +292,7 @@
           <a:p>
             <a:fld id="{C1267A05-D67B-4E4C-868C-590CB66AEB3E}" type="datetimeFigureOut">
               <a:rPr lang="en-US" smtClean="0"/>
-              <a:t>3/2/2023</a:t>
+              <a:t>3/3/2023</a:t>
             </a:fld>
             <a:endParaRPr lang="en-US"/>
           </a:p>
@@ -490,7 +490,7 @@
           <a:p>
             <a:fld id="{C1267A05-D67B-4E4C-868C-590CB66AEB3E}" type="datetimeFigureOut">
               <a:rPr lang="en-US" smtClean="0"/>
-              <a:t>3/2/2023</a:t>
+              <a:t>3/3/2023</a:t>
             </a:fld>
             <a:endParaRPr lang="en-US"/>
           </a:p>
@@ -698,7 +698,7 @@
           <a:p>
             <a:fld id="{C1267A05-D67B-4E4C-868C-590CB66AEB3E}" type="datetimeFigureOut">
               <a:rPr lang="en-US" smtClean="0"/>
-              <a:t>3/2/2023</a:t>
+              <a:t>3/3/2023</a:t>
             </a:fld>
             <a:endParaRPr lang="en-US"/>
           </a:p>
@@ -896,7 +896,7 @@
           <a:p>
             <a:fld id="{C1267A05-D67B-4E4C-868C-590CB66AEB3E}" type="datetimeFigureOut">
               <a:rPr lang="en-US" smtClean="0"/>
-              <a:t>3/2/2023</a:t>
+              <a:t>3/3/2023</a:t>
             </a:fld>
             <a:endParaRPr lang="en-US"/>
           </a:p>
@@ -1171,7 +1171,7 @@
           <a:p>
             <a:fld id="{C1267A05-D67B-4E4C-868C-590CB66AEB3E}" type="datetimeFigureOut">
               <a:rPr lang="en-US" smtClean="0"/>
-              <a:t>3/2/2023</a:t>
+              <a:t>3/3/2023</a:t>
             </a:fld>
             <a:endParaRPr lang="en-US"/>
           </a:p>
@@ -1436,7 +1436,7 @@
           <a:p>
             <a:fld id="{C1267A05-D67B-4E4C-868C-590CB66AEB3E}" type="datetimeFigureOut">
               <a:rPr lang="en-US" smtClean="0"/>
-              <a:t>3/2/2023</a:t>
+              <a:t>3/3/2023</a:t>
             </a:fld>
             <a:endParaRPr lang="en-US"/>
           </a:p>
@@ -1848,7 +1848,7 @@
           <a:p>
             <a:fld id="{C1267A05-D67B-4E4C-868C-590CB66AEB3E}" type="datetimeFigureOut">
               <a:rPr lang="en-US" smtClean="0"/>
-              <a:t>3/2/2023</a:t>
+              <a:t>3/3/2023</a:t>
             </a:fld>
             <a:endParaRPr lang="en-US"/>
           </a:p>
@@ -1989,7 +1989,7 @@
           <a:p>
             <a:fld id="{C1267A05-D67B-4E4C-868C-590CB66AEB3E}" type="datetimeFigureOut">
               <a:rPr lang="en-US" smtClean="0"/>
-              <a:t>3/2/2023</a:t>
+              <a:t>3/3/2023</a:t>
             </a:fld>
             <a:endParaRPr lang="en-US"/>
           </a:p>
@@ -2102,7 +2102,7 @@
           <a:p>
             <a:fld id="{C1267A05-D67B-4E4C-868C-590CB66AEB3E}" type="datetimeFigureOut">
               <a:rPr lang="en-US" smtClean="0"/>
-              <a:t>3/2/2023</a:t>
+              <a:t>3/3/2023</a:t>
             </a:fld>
             <a:endParaRPr lang="en-US"/>
           </a:p>
@@ -2413,7 +2413,7 @@
           <a:p>
             <a:fld id="{C1267A05-D67B-4E4C-868C-590CB66AEB3E}" type="datetimeFigureOut">
               <a:rPr lang="en-US" smtClean="0"/>
-              <a:t>3/2/2023</a:t>
+              <a:t>3/3/2023</a:t>
             </a:fld>
             <a:endParaRPr lang="en-US"/>
           </a:p>
@@ -2701,7 +2701,7 @@
           <a:p>
             <a:fld id="{C1267A05-D67B-4E4C-868C-590CB66AEB3E}" type="datetimeFigureOut">
               <a:rPr lang="en-US" smtClean="0"/>
-              <a:t>3/2/2023</a:t>
+              <a:t>3/3/2023</a:t>
             </a:fld>
             <a:endParaRPr lang="en-US"/>
           </a:p>
@@ -2942,7 +2942,7 @@
           <a:p>
             <a:fld id="{C1267A05-D67B-4E4C-868C-590CB66AEB3E}" type="datetimeFigureOut">
               <a:rPr lang="en-US" smtClean="0"/>
-              <a:t>3/2/2023</a:t>
+              <a:t>3/3/2023</a:t>
             </a:fld>
             <a:endParaRPr lang="en-US"/>
           </a:p>
@@ -14285,42 +14285,6 @@
       </p:pic>
       <p:pic>
         <p:nvPicPr>
-          <p:cNvPr id="15" name="Picture 14" descr="Shape&#10;&#10;Description automatically generated with low confidence">
-            <a:extLst>
-              <a:ext uri="{FF2B5EF4-FFF2-40B4-BE49-F238E27FC236}">
-                <a16:creationId xmlns:a16="http://schemas.microsoft.com/office/drawing/2014/main" id="{175610E1-0041-46EE-AD0E-68ECA93CD5BF}"/>
-              </a:ext>
-            </a:extLst>
-          </p:cNvPr>
-          <p:cNvPicPr>
-            <a:picLocks noChangeAspect="1"/>
-          </p:cNvPicPr>
-          <p:nvPr/>
-        </p:nvPicPr>
-        <p:blipFill>
-          <a:blip r:embed="rId4">
-            <a:extLst>
-              <a:ext uri="{28A0092B-C50C-407E-A947-70E740481C1C}">
-                <a14:useLocalDpi xmlns:a14="http://schemas.microsoft.com/office/drawing/2010/main" val="0"/>
-              </a:ext>
-            </a:extLst>
-          </a:blip>
-          <a:stretch>
-            <a:fillRect/>
-          </a:stretch>
-        </p:blipFill>
-        <p:spPr>
-          <a:xfrm>
-            <a:off x="4903624" y="4295689"/>
-            <a:ext cx="788042" cy="788042"/>
-          </a:xfrm>
-          <a:prstGeom prst="rect">
-            <a:avLst/>
-          </a:prstGeom>
-        </p:spPr>
-      </p:pic>
-      <p:pic>
-        <p:nvPicPr>
           <p:cNvPr id="16" name="Picture 15" descr="Shape&#10;&#10;Description automatically generated with low confidence">
             <a:extLst>
               <a:ext uri="{FF2B5EF4-FFF2-40B4-BE49-F238E27FC236}">
@@ -14529,78 +14493,6 @@
           <a:xfrm>
             <a:off x="8368126" y="5938885"/>
             <a:ext cx="717151" cy="717151"/>
-          </a:xfrm>
-          <a:prstGeom prst="rect">
-            <a:avLst/>
-          </a:prstGeom>
-        </p:spPr>
-      </p:pic>
-      <p:pic>
-        <p:nvPicPr>
-          <p:cNvPr id="26" name="Picture 25" descr="Shape&#10;&#10;Description automatically generated with low confidence">
-            <a:extLst>
-              <a:ext uri="{FF2B5EF4-FFF2-40B4-BE49-F238E27FC236}">
-                <a16:creationId xmlns:a16="http://schemas.microsoft.com/office/drawing/2014/main" id="{3A740241-21AD-4AB5-AEB0-792A28CF4CC0}"/>
-              </a:ext>
-            </a:extLst>
-          </p:cNvPr>
-          <p:cNvPicPr>
-            <a:picLocks noChangeAspect="1"/>
-          </p:cNvPicPr>
-          <p:nvPr/>
-        </p:nvPicPr>
-        <p:blipFill>
-          <a:blip r:embed="rId7">
-            <a:extLst>
-              <a:ext uri="{28A0092B-C50C-407E-A947-70E740481C1C}">
-                <a14:useLocalDpi xmlns:a14="http://schemas.microsoft.com/office/drawing/2010/main" val="0"/>
-              </a:ext>
-            </a:extLst>
-          </a:blip>
-          <a:stretch>
-            <a:fillRect/>
-          </a:stretch>
-        </p:blipFill>
-        <p:spPr>
-          <a:xfrm>
-            <a:off x="6620304" y="5092644"/>
-            <a:ext cx="788042" cy="788042"/>
-          </a:xfrm>
-          <a:prstGeom prst="rect">
-            <a:avLst/>
-          </a:prstGeom>
-        </p:spPr>
-      </p:pic>
-      <p:pic>
-        <p:nvPicPr>
-          <p:cNvPr id="29" name="Picture 28" descr="Shape&#10;&#10;Description automatically generated with low confidence">
-            <a:extLst>
-              <a:ext uri="{FF2B5EF4-FFF2-40B4-BE49-F238E27FC236}">
-                <a16:creationId xmlns:a16="http://schemas.microsoft.com/office/drawing/2014/main" id="{D857F951-B28A-42BD-8948-10FD4C1A76A2}"/>
-              </a:ext>
-            </a:extLst>
-          </p:cNvPr>
-          <p:cNvPicPr>
-            <a:picLocks noChangeAspect="1"/>
-          </p:cNvPicPr>
-          <p:nvPr/>
-        </p:nvPicPr>
-        <p:blipFill>
-          <a:blip r:embed="rId7">
-            <a:extLst>
-              <a:ext uri="{28A0092B-C50C-407E-A947-70E740481C1C}">
-                <a14:useLocalDpi xmlns:a14="http://schemas.microsoft.com/office/drawing/2010/main" val="0"/>
-              </a:ext>
-            </a:extLst>
-          </a:blip>
-          <a:stretch>
-            <a:fillRect/>
-          </a:stretch>
-        </p:blipFill>
-        <p:spPr>
-          <a:xfrm>
-            <a:off x="5755369" y="1861835"/>
-            <a:ext cx="788042" cy="788042"/>
           </a:xfrm>
           <a:prstGeom prst="rect">
             <a:avLst/>

</xml_diff>